<commit_message>
changed the game.py to haunted_house.py
</commit_message>
<xml_diff>
--- a/GAME/Game-Plan-Haunted-House.pptx
+++ b/GAME/Game-Plan-Haunted-House.pptx
@@ -217,7 +217,7 @@
           <a:p>
             <a:fld id="{B75771AB-93B1-B040-B676-09CF03291BDA}" type="datetimeFigureOut">
               <a:rPr lang="en-US" smtClean="0"/>
-              <a:t>10/21/2015</a:t>
+              <a:t>10/22/2015</a:t>
             </a:fld>
             <a:endParaRPr lang="en-US"/>
           </a:p>
@@ -731,7 +731,7 @@
           <a:p>
             <a:fld id="{795D5E40-79F0-7842-BE2A-EDEADB520A93}" type="datetimeFigureOut">
               <a:rPr lang="en-US" smtClean="0"/>
-              <a:t>10/21/2015</a:t>
+              <a:t>10/22/2015</a:t>
             </a:fld>
             <a:endParaRPr lang="en-US"/>
           </a:p>
@@ -1365,7 +1365,7 @@
           <a:p>
             <a:fld id="{795D5E40-79F0-7842-BE2A-EDEADB520A93}" type="datetimeFigureOut">
               <a:rPr lang="en-US" smtClean="0"/>
-              <a:t>10/21/2015</a:t>
+              <a:t>10/22/2015</a:t>
             </a:fld>
             <a:endParaRPr lang="en-US"/>
           </a:p>
@@ -1642,7 +1642,7 @@
           <a:p>
             <a:fld id="{795D5E40-79F0-7842-BE2A-EDEADB520A93}" type="datetimeFigureOut">
               <a:rPr lang="en-US" smtClean="0"/>
-              <a:t>10/21/2015</a:t>
+              <a:t>10/22/2015</a:t>
             </a:fld>
             <a:endParaRPr lang="en-US"/>
           </a:p>
@@ -1807,7 +1807,7 @@
           <a:p>
             <a:fld id="{795D5E40-79F0-7842-BE2A-EDEADB520A93}" type="datetimeFigureOut">
               <a:rPr lang="en-US" smtClean="0"/>
-              <a:t>10/21/2015</a:t>
+              <a:t>10/22/2015</a:t>
             </a:fld>
             <a:endParaRPr lang="en-US"/>
           </a:p>
@@ -1988,7 +1988,7 @@
           <a:p>
             <a:fld id="{795D5E40-79F0-7842-BE2A-EDEADB520A93}" type="datetimeFigureOut">
               <a:rPr lang="en-US" smtClean="0"/>
-              <a:t>10/21/2015</a:t>
+              <a:t>10/22/2015</a:t>
             </a:fld>
             <a:endParaRPr lang="en-US"/>
           </a:p>
@@ -2634,7 +2634,7 @@
           <a:p>
             <a:fld id="{795D5E40-79F0-7842-BE2A-EDEADB520A93}" type="datetimeFigureOut">
               <a:rPr lang="en-US" smtClean="0"/>
-              <a:t>10/21/2015</a:t>
+              <a:t>10/22/2015</a:t>
             </a:fld>
             <a:endParaRPr lang="en-US"/>
           </a:p>
@@ -3060,7 +3060,7 @@
           <a:p>
             <a:fld id="{795D5E40-79F0-7842-BE2A-EDEADB520A93}" type="datetimeFigureOut">
               <a:rPr lang="en-US" smtClean="0"/>
-              <a:t>10/21/2015</a:t>
+              <a:t>10/22/2015</a:t>
             </a:fld>
             <a:endParaRPr lang="en-US"/>
           </a:p>
@@ -3173,7 +3173,7 @@
           <a:p>
             <a:fld id="{795D5E40-79F0-7842-BE2A-EDEADB520A93}" type="datetimeFigureOut">
               <a:rPr lang="en-US" smtClean="0"/>
-              <a:t>10/21/2015</a:t>
+              <a:t>10/22/2015</a:t>
             </a:fld>
             <a:endParaRPr lang="en-US"/>
           </a:p>
@@ -3354,7 +3354,7 @@
           <a:p>
             <a:fld id="{795D5E40-79F0-7842-BE2A-EDEADB520A93}" type="datetimeFigureOut">
               <a:rPr lang="en-US" smtClean="0"/>
-              <a:t>10/21/2015</a:t>
+              <a:t>10/22/2015</a:t>
             </a:fld>
             <a:endParaRPr lang="en-US"/>
           </a:p>
@@ -3620,7 +3620,7 @@
           <a:p>
             <a:fld id="{795D5E40-79F0-7842-BE2A-EDEADB520A93}" type="datetimeFigureOut">
               <a:rPr lang="en-US" smtClean="0"/>
-              <a:t>10/21/2015</a:t>
+              <a:t>10/22/2015</a:t>
             </a:fld>
             <a:endParaRPr lang="en-US"/>
           </a:p>
@@ -4090,7 +4090,7 @@
           <a:p>
             <a:fld id="{795D5E40-79F0-7842-BE2A-EDEADB520A93}" type="datetimeFigureOut">
               <a:rPr lang="en-US" smtClean="0"/>
-              <a:t>10/21/2015</a:t>
+              <a:t>10/22/2015</a:t>
             </a:fld>
             <a:endParaRPr lang="en-US"/>
           </a:p>
@@ -4650,7 +4650,7 @@
           <a:p>
             <a:fld id="{795D5E40-79F0-7842-BE2A-EDEADB520A93}" type="datetimeFigureOut">
               <a:rPr lang="en-US" smtClean="0"/>
-              <a:t>10/21/2015</a:t>
+              <a:t>10/22/2015</a:t>
             </a:fld>
             <a:endParaRPr lang="en-US"/>
           </a:p>
@@ -5455,7 +5455,7 @@
         </p:spPr>
         <p:txBody>
           <a:bodyPr>
-            <a:normAutofit fontScale="92500" lnSpcReduction="10000"/>
+            <a:normAutofit lnSpcReduction="10000"/>
           </a:bodyPr>
           <a:lstStyle/>
           <a:p>
@@ -5487,7 +5487,7 @@
               </a:rPr>
               <a:t>The Movement of the Players</a:t>
             </a:r>
-            <a:endParaRPr lang="ar-SA" dirty="0" smtClean="0">
+            <a:endParaRPr lang="x-none" dirty="0" smtClean="0">
               <a:solidFill>
                 <a:schemeClr val="tx1"/>
               </a:solidFill>
@@ -5502,7 +5502,7 @@
               </a:rPr>
               <a:t>Features of the Haunted House:</a:t>
             </a:r>
-            <a:endParaRPr lang="ar-SA" dirty="0" smtClean="0">
+            <a:endParaRPr lang="x-none" dirty="0" smtClean="0">
               <a:solidFill>
                 <a:schemeClr val="tx1"/>
               </a:solidFill>
@@ -5599,8 +5599,13 @@
                   <a:srgbClr val="000090"/>
                 </a:solidFill>
               </a:rPr>
-              <a:t>The Keys &amp; Locked Doors</a:t>
-            </a:r>
+              <a:t>Searchable Objects</a:t>
+            </a:r>
+            <a:endParaRPr lang="en-US" dirty="0">
+              <a:solidFill>
+                <a:srgbClr val="000090"/>
+              </a:solidFill>
+            </a:endParaRPr>
           </a:p>
           <a:p>
             <a:pPr>
@@ -5613,13 +5618,8 @@
                   <a:srgbClr val="000090"/>
                 </a:solidFill>
               </a:rPr>
-              <a:t>Searchable objects</a:t>
-            </a:r>
-            <a:endParaRPr lang="en-US" dirty="0" smtClean="0">
-              <a:solidFill>
-                <a:srgbClr val="000090"/>
-              </a:solidFill>
-            </a:endParaRPr>
+              <a:t>Secrets </a:t>
+            </a:r>
           </a:p>
           <a:p>
             <a:pPr>
@@ -5632,34 +5632,7 @@
                   <a:srgbClr val="000090"/>
                 </a:solidFill>
               </a:rPr>
-              <a:t>Secrets </a:t>
-            </a:r>
-            <a:endParaRPr lang="en-US" dirty="0" smtClean="0">
-              <a:solidFill>
-                <a:srgbClr val="000090"/>
-              </a:solidFill>
-            </a:endParaRPr>
-          </a:p>
-          <a:p>
-            <a:pPr>
-              <a:buFont typeface="Wingdings" charset="2"/>
-              <a:buChar char="²"/>
-            </a:pPr>
-            <a:r>
-              <a:rPr lang="en-US" dirty="0" smtClean="0">
-                <a:solidFill>
-                  <a:srgbClr val="000090"/>
-                </a:solidFill>
-              </a:rPr>
-              <a:t>Status </a:t>
-            </a:r>
-            <a:r>
-              <a:rPr lang="en-US" dirty="0" smtClean="0">
-                <a:solidFill>
-                  <a:srgbClr val="000090"/>
-                </a:solidFill>
-              </a:rPr>
-              <a:t>Window</a:t>
+              <a:t>Statue Window</a:t>
             </a:r>
           </a:p>
           <a:p>
@@ -6078,7 +6051,7 @@
                                         <p:tgtEl>
                                           <p:spTgt spid="3">
                                             <p:txEl>
-                                              <p:pRg st="7" end="7"/>
+                                              <p:pRg st="8" end="8"/>
                                             </p:txEl>
                                           </p:spTgt>
                                         </p:tgtEl>
@@ -6109,7 +6082,7 @@
                                         <p:tgtEl>
                                           <p:spTgt spid="3">
                                             <p:txEl>
-                                              <p:pRg st="8" end="8"/>
+                                              <p:pRg st="7" end="7"/>
                                             </p:txEl>
                                           </p:spTgt>
                                         </p:tgtEl>
@@ -6155,15 +6128,33 @@
                                   </p:childTnLst>
                                 </p:cTn>
                               </p:par>
+                            </p:childTnLst>
+                          </p:cTn>
+                        </p:par>
+                      </p:childTnLst>
+                    </p:cTn>
+                  </p:par>
+                  <p:par>
+                    <p:cTn id="33" fill="hold">
+                      <p:stCondLst>
+                        <p:cond delay="indefinite"/>
+                      </p:stCondLst>
+                      <p:childTnLst>
+                        <p:par>
+                          <p:cTn id="34" fill="hold">
+                            <p:stCondLst>
+                              <p:cond delay="0"/>
+                            </p:stCondLst>
+                            <p:childTnLst>
                               <p:par>
-                                <p:cTn id="33" presetID="1" presetClass="entr" presetSubtype="0" fill="hold" nodeType="withEffect">
+                                <p:cTn id="35" presetID="1" presetClass="entr" presetSubtype="0" fill="hold" nodeType="clickEffect">
                                   <p:stCondLst>
                                     <p:cond delay="0"/>
                                   </p:stCondLst>
                                   <p:childTnLst>
                                     <p:set>
                                       <p:cBhvr>
-                                        <p:cTn id="34" dur="1" fill="hold">
+                                        <p:cTn id="36" dur="1" fill="hold">
                                           <p:stCondLst>
                                             <p:cond delay="0"/>
                                           </p:stCondLst>
@@ -6193,26 +6184,26 @@
                     </p:cTn>
                   </p:par>
                   <p:par>
-                    <p:cTn id="35" fill="hold">
+                    <p:cTn id="37" fill="hold">
                       <p:stCondLst>
                         <p:cond delay="indefinite"/>
                       </p:stCondLst>
                       <p:childTnLst>
                         <p:par>
-                          <p:cTn id="36" fill="hold">
+                          <p:cTn id="38" fill="hold">
                             <p:stCondLst>
                               <p:cond delay="0"/>
                             </p:stCondLst>
                             <p:childTnLst>
                               <p:par>
-                                <p:cTn id="37" presetID="1" presetClass="entr" presetSubtype="0" fill="hold" nodeType="clickEffect">
+                                <p:cTn id="39" presetID="1" presetClass="entr" presetSubtype="0" fill="hold" nodeType="clickEffect">
                                   <p:stCondLst>
                                     <p:cond delay="0"/>
                                   </p:stCondLst>
                                   <p:childTnLst>
                                     <p:set>
                                       <p:cBhvr>
-                                        <p:cTn id="38" dur="1" fill="hold">
+                                        <p:cTn id="40" dur="1" fill="hold">
                                           <p:stCondLst>
                                             <p:cond delay="0"/>
                                           </p:stCondLst>
@@ -6221,55 +6212,6 @@
                                           <p:spTgt spid="3">
                                             <p:txEl>
                                               <p:pRg st="11" end="11"/>
-                                            </p:txEl>
-                                          </p:spTgt>
-                                        </p:tgtEl>
-                                        <p:attrNameLst>
-                                          <p:attrName>style.visibility</p:attrName>
-                                        </p:attrNameLst>
-                                      </p:cBhvr>
-                                      <p:to>
-                                        <p:strVal val="visible"/>
-                                      </p:to>
-                                    </p:set>
-                                  </p:childTnLst>
-                                </p:cTn>
-                              </p:par>
-                            </p:childTnLst>
-                          </p:cTn>
-                        </p:par>
-                      </p:childTnLst>
-                    </p:cTn>
-                  </p:par>
-                  <p:par>
-                    <p:cTn id="39" fill="hold">
-                      <p:stCondLst>
-                        <p:cond delay="indefinite"/>
-                      </p:stCondLst>
-                      <p:childTnLst>
-                        <p:par>
-                          <p:cTn id="40" fill="hold">
-                            <p:stCondLst>
-                              <p:cond delay="0"/>
-                            </p:stCondLst>
-                            <p:childTnLst>
-                              <p:par>
-                                <p:cTn id="41" presetID="1" presetClass="entr" presetSubtype="0" fill="hold" nodeType="clickEffect">
-                                  <p:stCondLst>
-                                    <p:cond delay="0"/>
-                                  </p:stCondLst>
-                                  <p:childTnLst>
-                                    <p:set>
-                                      <p:cBhvr>
-                                        <p:cTn id="42" dur="1" fill="hold">
-                                          <p:stCondLst>
-                                            <p:cond delay="0"/>
-                                          </p:stCondLst>
-                                        </p:cTn>
-                                        <p:tgtEl>
-                                          <p:spTgt spid="3">
-                                            <p:txEl>
-                                              <p:pRg st="12" end="12"/>
                                             </p:txEl>
                                           </p:spTgt>
                                         </p:tgtEl>
@@ -7035,30 +6977,6 @@
           </a:bodyPr>
           <a:lstStyle/>
           <a:p>
-            <a:pPr marL="285750" indent="-285750">
-              <a:buFont typeface="Arial"/>
-              <a:buChar char="•"/>
-            </a:pPr>
-            <a:r>
-              <a:rPr lang="en-US" dirty="0" smtClean="0">
-                <a:solidFill>
-                  <a:srgbClr val="000090"/>
-                </a:solidFill>
-              </a:rPr>
-              <a:t>Story’s location:</a:t>
-            </a:r>
-          </a:p>
-          <a:p>
-            <a:r>
-              <a:rPr lang="en-US" dirty="0" smtClean="0">
-                <a:solidFill>
-                  <a:srgbClr val="000090"/>
-                </a:solidFill>
-              </a:rPr>
-              <a:t>-</a:t>
-            </a:r>
-          </a:p>
-          <a:p>
             <a:endParaRPr lang="en-US" dirty="0" smtClean="0">
               <a:solidFill>
                 <a:srgbClr val="000090"/>
@@ -7080,14 +6998,6 @@
             </a:r>
           </a:p>
           <a:p>
-            <a:r>
-              <a:rPr lang="en-US" dirty="0" smtClean="0">
-                <a:solidFill>
-                  <a:srgbClr val="000090"/>
-                </a:solidFill>
-              </a:rPr>
-              <a:t>-4 different characters</a:t>
-            </a:r>
             <a:endParaRPr lang="en-US" dirty="0" smtClean="0">
               <a:solidFill>
                 <a:srgbClr val="000090"/>
@@ -7095,6 +7005,29 @@
             </a:endParaRPr>
           </a:p>
           <a:p>
+            <a:r>
+              <a:rPr lang="en-US" dirty="0" smtClean="0">
+                <a:solidFill>
+                  <a:srgbClr val="000090"/>
+                </a:solidFill>
+              </a:rPr>
+              <a:t>- 4 </a:t>
+            </a:r>
+            <a:r>
+              <a:rPr lang="en-US" dirty="0">
+                <a:solidFill>
+                  <a:srgbClr val="000090"/>
+                </a:solidFill>
+              </a:rPr>
+              <a:t>different characters</a:t>
+            </a:r>
+            <a:endParaRPr lang="en-US" dirty="0" smtClean="0">
+              <a:solidFill>
+                <a:srgbClr val="000090"/>
+              </a:solidFill>
+            </a:endParaRPr>
+          </a:p>
+          <a:p>
             <a:endParaRPr lang="en-US" dirty="0">
               <a:solidFill>
                 <a:srgbClr val="000090"/>
@@ -7112,8 +7045,15 @@
                   <a:srgbClr val="000090"/>
                 </a:solidFill>
               </a:rPr>
-              <a:t>It contain :</a:t>
-            </a:r>
+              <a:t>It contains :</a:t>
+            </a:r>
+          </a:p>
+          <a:p>
+            <a:endParaRPr lang="en-US" dirty="0" smtClean="0">
+              <a:solidFill>
+                <a:srgbClr val="000090"/>
+              </a:solidFill>
+            </a:endParaRPr>
           </a:p>
           <a:p>
             <a:pPr marL="285750" indent="-285750">
@@ -7146,18 +7086,13 @@
               <a:buChar char="•"/>
             </a:pPr>
             <a:r>
-              <a:rPr lang="en-US" dirty="0" smtClean="0">
+              <a:rPr lang="en-US" dirty="0">
                 <a:solidFill>
                   <a:srgbClr val="000090"/>
                 </a:solidFill>
               </a:rPr>
               <a:t>Enemies occupy rooms, so you’ll need to kill them</a:t>
             </a:r>
-            <a:endParaRPr lang="en-US" dirty="0" smtClean="0">
-              <a:solidFill>
-                <a:srgbClr val="000090"/>
-              </a:solidFill>
-            </a:endParaRPr>
           </a:p>
           <a:p>
             <a:pPr marL="285750" indent="-285750">
@@ -7270,7 +7205,7 @@
                                         <p:tgtEl>
                                           <p:spTgt spid="8">
                                             <p:txEl>
-                                              <p:pRg st="0" end="0"/>
+                                              <p:pRg st="1" end="1"/>
                                             </p:txEl>
                                           </p:spTgt>
                                         </p:tgtEl>
@@ -7301,7 +7236,7 @@
                                         <p:tgtEl>
                                           <p:spTgt spid="8">
                                             <p:txEl>
-                                              <p:pRg st="1" end="1"/>
+                                              <p:pRg st="3" end="3"/>
                                             </p:txEl>
                                           </p:spTgt>
                                         </p:tgtEl>
@@ -7350,7 +7285,7 @@
                                         <p:tgtEl>
                                           <p:spTgt spid="8">
                                             <p:txEl>
-                                              <p:pRg st="3" end="3"/>
+                                              <p:pRg st="5" end="5"/>
                                             </p:txEl>
                                           </p:spTgt>
                                         </p:tgtEl>
@@ -7381,7 +7316,7 @@
                                         <p:tgtEl>
                                           <p:spTgt spid="8">
                                             <p:txEl>
-                                              <p:pRg st="4" end="4"/>
+                                              <p:pRg st="7" end="7"/>
                                             </p:txEl>
                                           </p:spTgt>
                                         </p:tgtEl>
@@ -7428,42 +7363,7 @@
                                           </p:stCondLst>
                                         </p:cTn>
                                         <p:tgtEl>
-                                          <p:spTgt spid="8">
-                                            <p:txEl>
-                                              <p:pRg st="6" end="6"/>
-                                            </p:txEl>
-                                          </p:spTgt>
-                                        </p:tgtEl>
-                                        <p:attrNameLst>
-                                          <p:attrName>style.visibility</p:attrName>
-                                        </p:attrNameLst>
-                                      </p:cBhvr>
-                                      <p:to>
-                                        <p:strVal val="visible"/>
-                                      </p:to>
-                                    </p:set>
-                                  </p:childTnLst>
-                                </p:cTn>
-                              </p:par>
-                              <p:par>
-                                <p:cTn id="23" presetID="1" presetClass="entr" presetSubtype="0" fill="hold" nodeType="withEffect">
-                                  <p:stCondLst>
-                                    <p:cond delay="0"/>
-                                  </p:stCondLst>
-                                  <p:childTnLst>
-                                    <p:set>
-                                      <p:cBhvr>
-                                        <p:cTn id="24" dur="1" fill="hold">
-                                          <p:stCondLst>
-                                            <p:cond delay="0"/>
-                                          </p:stCondLst>
-                                        </p:cTn>
-                                        <p:tgtEl>
-                                          <p:spTgt spid="8">
-                                            <p:txEl>
-                                              <p:pRg st="7" end="7"/>
-                                            </p:txEl>
-                                          </p:spTgt>
+                                          <p:spTgt spid="6"/>
                                         </p:tgtEl>
                                         <p:attrNameLst>
                                           <p:attrName>style.visibility</p:attrName>
@@ -7483,53 +7383,26 @@
                     </p:cTn>
                   </p:par>
                   <p:par>
-                    <p:cTn id="25" fill="hold">
+                    <p:cTn id="23" fill="hold">
                       <p:stCondLst>
                         <p:cond delay="indefinite"/>
                       </p:stCondLst>
                       <p:childTnLst>
                         <p:par>
-                          <p:cTn id="26" fill="hold">
+                          <p:cTn id="24" fill="hold">
                             <p:stCondLst>
                               <p:cond delay="0"/>
                             </p:stCondLst>
                             <p:childTnLst>
                               <p:par>
-                                <p:cTn id="27" presetID="1" presetClass="entr" presetSubtype="0" fill="hold" nodeType="clickEffect">
+                                <p:cTn id="25" presetID="1" presetClass="entr" presetSubtype="0" fill="hold" nodeType="clickEffect">
                                   <p:stCondLst>
                                     <p:cond delay="0"/>
                                   </p:stCondLst>
                                   <p:childTnLst>
                                     <p:set>
                                       <p:cBhvr>
-                                        <p:cTn id="28" dur="1" fill="hold">
-                                          <p:stCondLst>
-                                            <p:cond delay="0"/>
-                                          </p:stCondLst>
-                                        </p:cTn>
-                                        <p:tgtEl>
-                                          <p:spTgt spid="6"/>
-                                        </p:tgtEl>
-                                        <p:attrNameLst>
-                                          <p:attrName>style.visibility</p:attrName>
-                                        </p:attrNameLst>
-                                      </p:cBhvr>
-                                      <p:to>
-                                        <p:strVal val="visible"/>
-                                      </p:to>
-                                    </p:set>
-                                  </p:childTnLst>
-                                </p:cTn>
-                              </p:par>
-                              <p:par>
-                                <p:cTn id="29" presetID="1" presetClass="entr" presetSubtype="0" fill="hold" nodeType="withEffect">
-                                  <p:stCondLst>
-                                    <p:cond delay="0"/>
-                                  </p:stCondLst>
-                                  <p:childTnLst>
-                                    <p:set>
-                                      <p:cBhvr>
-                                        <p:cTn id="30" dur="1" fill="hold">
+                                        <p:cTn id="26" dur="1" fill="hold">
                                           <p:stCondLst>
                                             <p:cond delay="0"/>
                                           </p:stCondLst>
@@ -7617,49 +7490,98 @@
           </a:xfrm>
         </p:spPr>
         <p:txBody>
-          <a:bodyPr>
-            <a:normAutofit/>
-          </a:bodyPr>
+          <a:bodyPr/>
           <a:lstStyle/>
+          <a:p>
+            <a:r>
+              <a:rPr lang="en-US" dirty="0" smtClean="0">
+                <a:solidFill>
+                  <a:srgbClr val="000090"/>
+                </a:solidFill>
+              </a:rPr>
+              <a:t>You </a:t>
+            </a:r>
+            <a:r>
+              <a:rPr lang="en-US" dirty="0">
+                <a:solidFill>
+                  <a:srgbClr val="000090"/>
+                </a:solidFill>
+              </a:rPr>
+              <a:t>now can view </a:t>
+            </a:r>
+            <a:r>
+              <a:rPr lang="en-US" dirty="0" smtClean="0">
+                <a:solidFill>
+                  <a:srgbClr val="000090"/>
+                </a:solidFill>
+              </a:rPr>
+              <a:t>your inventory.</a:t>
+            </a:r>
+            <a:endParaRPr lang="en-US" dirty="0">
+              <a:solidFill>
+                <a:srgbClr val="000090"/>
+              </a:solidFill>
+            </a:endParaRPr>
+          </a:p>
           <a:p>
             <a:pPr marL="114300" indent="0">
               <a:buNone/>
             </a:pPr>
+            <a:endParaRPr lang="en-US" dirty="0"/>
+          </a:p>
+          <a:p>
+            <a:r>
+              <a:rPr lang="en-US" dirty="0" smtClean="0">
+                <a:solidFill>
+                  <a:srgbClr val="000090"/>
+                </a:solidFill>
+              </a:rPr>
+              <a:t> Allows </a:t>
+            </a:r>
+            <a:r>
+              <a:rPr lang="en-US" dirty="0">
+                <a:solidFill>
+                  <a:srgbClr val="000090"/>
+                </a:solidFill>
+              </a:rPr>
+              <a:t>you to:</a:t>
+            </a:r>
+          </a:p>
+          <a:p>
+            <a:pPr>
+              <a:buFont typeface="Wingdings" charset="2"/>
+              <a:buChar char="²"/>
+            </a:pPr>
             <a:r>
               <a:rPr lang="en-US" dirty="0" smtClean="0"/>
-              <a:t>-You now can view you inventory</a:t>
-            </a:r>
-          </a:p>
-          <a:p>
-            <a:pPr marL="114300" indent="0">
-              <a:buNone/>
+              <a:t>Use an </a:t>
+            </a:r>
+            <a:r>
+              <a:rPr lang="en-US" dirty="0"/>
+              <a:t>item</a:t>
+            </a:r>
+          </a:p>
+          <a:p>
+            <a:pPr>
+              <a:buFont typeface="Wingdings" charset="2"/>
+              <a:buChar char="²"/>
             </a:pPr>
-            <a:endParaRPr lang="en-US" dirty="0" smtClean="0"/>
-          </a:p>
-          <a:p>
-            <a:pPr marL="114300" indent="0">
-              <a:buNone/>
+            <a:r>
+              <a:rPr lang="en-US" dirty="0" smtClean="0"/>
+              <a:t>Drop </a:t>
+            </a:r>
+            <a:r>
+              <a:rPr lang="en-US" dirty="0"/>
+              <a:t>an item</a:t>
+            </a:r>
+          </a:p>
+          <a:p>
+            <a:pPr>
+              <a:buFont typeface="Wingdings" charset="2"/>
+              <a:buChar char="²"/>
             </a:pPr>
             <a:r>
-              <a:rPr lang="en-US" dirty="0" smtClean="0"/>
-              <a:t>-Allows you to:</a:t>
-            </a:r>
-          </a:p>
-          <a:p>
-            <a:r>
-              <a:rPr lang="en-US" dirty="0" smtClean="0"/>
-              <a:t>use and item</a:t>
-            </a:r>
-          </a:p>
-          <a:p>
-            <a:r>
-              <a:rPr lang="en-US" dirty="0" smtClean="0"/>
-              <a:t>drop an item</a:t>
-            </a:r>
-          </a:p>
-          <a:p>
-            <a:r>
-              <a:rPr lang="en-US" dirty="0" smtClean="0"/>
+              <a:rPr lang="en-US" dirty="0"/>
               <a:t>View items</a:t>
             </a:r>
           </a:p>
@@ -7667,14 +7589,35 @@
             <a:endParaRPr lang="en-US" dirty="0"/>
           </a:p>
           <a:p>
-            <a:pPr marL="114300" indent="0">
-              <a:buNone/>
-            </a:pPr>
-            <a:r>
-              <a:rPr lang="en-US" dirty="0" smtClean="0"/>
-              <a:t>-Keeps the display clear of clutter as you could carry lots of small items</a:t>
-            </a:r>
-            <a:endParaRPr lang="en-US" dirty="0" smtClean="0"/>
+            <a:r>
+              <a:rPr lang="en-US" dirty="0" smtClean="0">
+                <a:solidFill>
+                  <a:srgbClr val="000090"/>
+                </a:solidFill>
+              </a:rPr>
+              <a:t>Keeps </a:t>
+            </a:r>
+            <a:r>
+              <a:rPr lang="en-US" dirty="0">
+                <a:solidFill>
+                  <a:srgbClr val="000090"/>
+                </a:solidFill>
+              </a:rPr>
+              <a:t>the display clear of clutter as you could carry lots of small </a:t>
+            </a:r>
+            <a:r>
+              <a:rPr lang="en-US" dirty="0" smtClean="0">
+                <a:solidFill>
+                  <a:srgbClr val="000090"/>
+                </a:solidFill>
+              </a:rPr>
+              <a:t>items.</a:t>
+            </a:r>
+            <a:endParaRPr lang="en-US" dirty="0">
+              <a:solidFill>
+                <a:srgbClr val="000090"/>
+              </a:solidFill>
+            </a:endParaRPr>
           </a:p>
         </p:txBody>
       </p:sp>
@@ -7727,7 +7670,270 @@
   <p:timing>
     <p:tnLst>
       <p:par>
-        <p:cTn id="1" dur="indefinite" restart="never" nodeType="tmRoot"/>
+        <p:cTn id="1" dur="indefinite" restart="never" nodeType="tmRoot">
+          <p:childTnLst>
+            <p:seq concurrent="1" nextAc="seek">
+              <p:cTn id="2" dur="indefinite" nodeType="mainSeq">
+                <p:childTnLst>
+                  <p:par>
+                    <p:cTn id="3" fill="hold">
+                      <p:stCondLst>
+                        <p:cond delay="indefinite"/>
+                      </p:stCondLst>
+                      <p:childTnLst>
+                        <p:par>
+                          <p:cTn id="4" fill="hold">
+                            <p:stCondLst>
+                              <p:cond delay="0"/>
+                            </p:stCondLst>
+                            <p:childTnLst>
+                              <p:par>
+                                <p:cTn id="5" presetID="1" presetClass="entr" presetSubtype="0" fill="hold" nodeType="clickEffect">
+                                  <p:stCondLst>
+                                    <p:cond delay="0"/>
+                                  </p:stCondLst>
+                                  <p:childTnLst>
+                                    <p:set>
+                                      <p:cBhvr>
+                                        <p:cTn id="6" dur="1" fill="hold">
+                                          <p:stCondLst>
+                                            <p:cond delay="0"/>
+                                          </p:stCondLst>
+                                        </p:cTn>
+                                        <p:tgtEl>
+                                          <p:spTgt spid="3">
+                                            <p:txEl>
+                                              <p:pRg st="0" end="0"/>
+                                            </p:txEl>
+                                          </p:spTgt>
+                                        </p:tgtEl>
+                                        <p:attrNameLst>
+                                          <p:attrName>style.visibility</p:attrName>
+                                        </p:attrNameLst>
+                                      </p:cBhvr>
+                                      <p:to>
+                                        <p:strVal val="visible"/>
+                                      </p:to>
+                                    </p:set>
+                                  </p:childTnLst>
+                                </p:cTn>
+                              </p:par>
+                            </p:childTnLst>
+                          </p:cTn>
+                        </p:par>
+                      </p:childTnLst>
+                    </p:cTn>
+                  </p:par>
+                  <p:par>
+                    <p:cTn id="7" fill="hold">
+                      <p:stCondLst>
+                        <p:cond delay="indefinite"/>
+                      </p:stCondLst>
+                      <p:childTnLst>
+                        <p:par>
+                          <p:cTn id="8" fill="hold">
+                            <p:stCondLst>
+                              <p:cond delay="0"/>
+                            </p:stCondLst>
+                            <p:childTnLst>
+                              <p:par>
+                                <p:cTn id="9" presetID="1" presetClass="entr" presetSubtype="0" fill="hold" nodeType="clickEffect">
+                                  <p:stCondLst>
+                                    <p:cond delay="0"/>
+                                  </p:stCondLst>
+                                  <p:childTnLst>
+                                    <p:set>
+                                      <p:cBhvr>
+                                        <p:cTn id="10" dur="1" fill="hold">
+                                          <p:stCondLst>
+                                            <p:cond delay="0"/>
+                                          </p:stCondLst>
+                                        </p:cTn>
+                                        <p:tgtEl>
+                                          <p:spTgt spid="3">
+                                            <p:txEl>
+                                              <p:pRg st="2" end="2"/>
+                                            </p:txEl>
+                                          </p:spTgt>
+                                        </p:tgtEl>
+                                        <p:attrNameLst>
+                                          <p:attrName>style.visibility</p:attrName>
+                                        </p:attrNameLst>
+                                      </p:cBhvr>
+                                      <p:to>
+                                        <p:strVal val="visible"/>
+                                      </p:to>
+                                    </p:set>
+                                  </p:childTnLst>
+                                </p:cTn>
+                              </p:par>
+                              <p:par>
+                                <p:cTn id="11" presetID="1" presetClass="entr" presetSubtype="0" fill="hold" nodeType="withEffect">
+                                  <p:stCondLst>
+                                    <p:cond delay="0"/>
+                                  </p:stCondLst>
+                                  <p:childTnLst>
+                                    <p:set>
+                                      <p:cBhvr>
+                                        <p:cTn id="12" dur="1" fill="hold">
+                                          <p:stCondLst>
+                                            <p:cond delay="0"/>
+                                          </p:stCondLst>
+                                        </p:cTn>
+                                        <p:tgtEl>
+                                          <p:spTgt spid="3">
+                                            <p:txEl>
+                                              <p:pRg st="3" end="3"/>
+                                            </p:txEl>
+                                          </p:spTgt>
+                                        </p:tgtEl>
+                                        <p:attrNameLst>
+                                          <p:attrName>style.visibility</p:attrName>
+                                        </p:attrNameLst>
+                                      </p:cBhvr>
+                                      <p:to>
+                                        <p:strVal val="visible"/>
+                                      </p:to>
+                                    </p:set>
+                                  </p:childTnLst>
+                                </p:cTn>
+                              </p:par>
+                              <p:par>
+                                <p:cTn id="13" presetID="1" presetClass="entr" presetSubtype="0" fill="hold" nodeType="withEffect">
+                                  <p:stCondLst>
+                                    <p:cond delay="0"/>
+                                  </p:stCondLst>
+                                  <p:childTnLst>
+                                    <p:set>
+                                      <p:cBhvr>
+                                        <p:cTn id="14" dur="1" fill="hold">
+                                          <p:stCondLst>
+                                            <p:cond delay="0"/>
+                                          </p:stCondLst>
+                                        </p:cTn>
+                                        <p:tgtEl>
+                                          <p:spTgt spid="3">
+                                            <p:txEl>
+                                              <p:pRg st="4" end="4"/>
+                                            </p:txEl>
+                                          </p:spTgt>
+                                        </p:tgtEl>
+                                        <p:attrNameLst>
+                                          <p:attrName>style.visibility</p:attrName>
+                                        </p:attrNameLst>
+                                      </p:cBhvr>
+                                      <p:to>
+                                        <p:strVal val="visible"/>
+                                      </p:to>
+                                    </p:set>
+                                  </p:childTnLst>
+                                </p:cTn>
+                              </p:par>
+                              <p:par>
+                                <p:cTn id="15" presetID="1" presetClass="entr" presetSubtype="0" fill="hold" nodeType="withEffect">
+                                  <p:stCondLst>
+                                    <p:cond delay="0"/>
+                                  </p:stCondLst>
+                                  <p:childTnLst>
+                                    <p:set>
+                                      <p:cBhvr>
+                                        <p:cTn id="16" dur="1" fill="hold">
+                                          <p:stCondLst>
+                                            <p:cond delay="0"/>
+                                          </p:stCondLst>
+                                        </p:cTn>
+                                        <p:tgtEl>
+                                          <p:spTgt spid="3">
+                                            <p:txEl>
+                                              <p:pRg st="5" end="5"/>
+                                            </p:txEl>
+                                          </p:spTgt>
+                                        </p:tgtEl>
+                                        <p:attrNameLst>
+                                          <p:attrName>style.visibility</p:attrName>
+                                        </p:attrNameLst>
+                                      </p:cBhvr>
+                                      <p:to>
+                                        <p:strVal val="visible"/>
+                                      </p:to>
+                                    </p:set>
+                                  </p:childTnLst>
+                                </p:cTn>
+                              </p:par>
+                            </p:childTnLst>
+                          </p:cTn>
+                        </p:par>
+                      </p:childTnLst>
+                    </p:cTn>
+                  </p:par>
+                  <p:par>
+                    <p:cTn id="17" fill="hold">
+                      <p:stCondLst>
+                        <p:cond delay="indefinite"/>
+                      </p:stCondLst>
+                      <p:childTnLst>
+                        <p:par>
+                          <p:cTn id="18" fill="hold">
+                            <p:stCondLst>
+                              <p:cond delay="0"/>
+                            </p:stCondLst>
+                            <p:childTnLst>
+                              <p:par>
+                                <p:cTn id="19" presetID="1" presetClass="entr" presetSubtype="0" fill="hold" nodeType="clickEffect">
+                                  <p:stCondLst>
+                                    <p:cond delay="0"/>
+                                  </p:stCondLst>
+                                  <p:childTnLst>
+                                    <p:set>
+                                      <p:cBhvr>
+                                        <p:cTn id="20" dur="1" fill="hold">
+                                          <p:stCondLst>
+                                            <p:cond delay="0"/>
+                                          </p:stCondLst>
+                                        </p:cTn>
+                                        <p:tgtEl>
+                                          <p:spTgt spid="3">
+                                            <p:txEl>
+                                              <p:pRg st="7" end="7"/>
+                                            </p:txEl>
+                                          </p:spTgt>
+                                        </p:tgtEl>
+                                        <p:attrNameLst>
+                                          <p:attrName>style.visibility</p:attrName>
+                                        </p:attrNameLst>
+                                      </p:cBhvr>
+                                      <p:to>
+                                        <p:strVal val="visible"/>
+                                      </p:to>
+                                    </p:set>
+                                  </p:childTnLst>
+                                </p:cTn>
+                              </p:par>
+                            </p:childTnLst>
+                          </p:cTn>
+                        </p:par>
+                      </p:childTnLst>
+                    </p:cTn>
+                  </p:par>
+                </p:childTnLst>
+              </p:cTn>
+              <p:prevCondLst>
+                <p:cond evt="onPrev" delay="0">
+                  <p:tgtEl>
+                    <p:sldTgt/>
+                  </p:tgtEl>
+                </p:cond>
+              </p:prevCondLst>
+              <p:nextCondLst>
+                <p:cond evt="onNext" delay="0">
+                  <p:tgtEl>
+                    <p:sldTgt/>
+                  </p:tgtEl>
+                </p:cond>
+              </p:nextCondLst>
+            </p:seq>
+          </p:childTnLst>
+        </p:cTn>
       </p:par>
     </p:tnLst>
   </p:timing>
@@ -7761,106 +7967,268 @@
             <p:ph idx="1"/>
           </p:nvPr>
         </p:nvSpPr>
-        <p:spPr/>
+        <p:spPr>
+          <a:xfrm>
+            <a:off x="297257" y="1671540"/>
+            <a:ext cx="8443591" cy="4921327"/>
+          </a:xfrm>
+        </p:spPr>
         <p:txBody>
           <a:bodyPr>
-            <a:normAutofit fontScale="92500" lnSpcReduction="20000"/>
+            <a:normAutofit fontScale="85000" lnSpcReduction="20000"/>
           </a:bodyPr>
           <a:lstStyle/>
+          <a:p>
+            <a:r>
+              <a:rPr lang="en-US" dirty="0" smtClean="0">
+                <a:solidFill>
+                  <a:srgbClr val="000000"/>
+                </a:solidFill>
+              </a:rPr>
+              <a:t>Players </a:t>
+            </a:r>
+            <a:r>
+              <a:rPr lang="en-US" dirty="0">
+                <a:solidFill>
+                  <a:srgbClr val="000000"/>
+                </a:solidFill>
+              </a:rPr>
+              <a:t>can move using the </a:t>
+            </a:r>
+            <a:r>
+              <a:rPr lang="en-US" dirty="0" smtClean="0">
+                <a:solidFill>
+                  <a:srgbClr val="000000"/>
+                </a:solidFill>
+              </a:rPr>
+              <a:t>directions :</a:t>
+            </a:r>
+          </a:p>
           <a:p>
             <a:pPr marL="114300" indent="0">
               <a:buNone/>
             </a:pPr>
-            <a:r>
-              <a:rPr lang="en-US" dirty="0" smtClean="0"/>
-              <a:t>-Players can move using the directions</a:t>
-            </a:r>
-          </a:p>
-          <a:p>
-            <a:r>
-              <a:rPr lang="en-US" dirty="0" smtClean="0"/>
+            <a:endParaRPr lang="en-US" dirty="0"/>
+          </a:p>
+          <a:p>
+            <a:pPr>
+              <a:buFont typeface="Wingdings" charset="2"/>
+              <a:buChar char="²"/>
+            </a:pPr>
+            <a:r>
+              <a:rPr lang="en-US" dirty="0">
+                <a:solidFill>
+                  <a:srgbClr val="000090"/>
+                </a:solidFill>
+              </a:rPr>
               <a:t>North</a:t>
             </a:r>
           </a:p>
           <a:p>
-            <a:r>
-              <a:rPr lang="en-US" dirty="0" smtClean="0"/>
+            <a:pPr>
+              <a:buFont typeface="Wingdings" charset="2"/>
+              <a:buChar char="²"/>
+            </a:pPr>
+            <a:r>
+              <a:rPr lang="en-US" dirty="0">
+                <a:solidFill>
+                  <a:srgbClr val="000090"/>
+                </a:solidFill>
+              </a:rPr>
               <a:t>East</a:t>
             </a:r>
           </a:p>
           <a:p>
-            <a:r>
-              <a:rPr lang="en-US" dirty="0" smtClean="0"/>
+            <a:pPr>
+              <a:buFont typeface="Wingdings" charset="2"/>
+              <a:buChar char="²"/>
+            </a:pPr>
+            <a:r>
+              <a:rPr lang="en-US" dirty="0">
+                <a:solidFill>
+                  <a:srgbClr val="000090"/>
+                </a:solidFill>
+              </a:rPr>
               <a:t>South</a:t>
             </a:r>
           </a:p>
           <a:p>
-            <a:r>
-              <a:rPr lang="en-US" dirty="0" smtClean="0"/>
+            <a:pPr>
+              <a:buFont typeface="Wingdings" charset="2"/>
+              <a:buChar char="²"/>
+            </a:pPr>
+            <a:r>
+              <a:rPr lang="en-US" dirty="0">
+                <a:solidFill>
+                  <a:srgbClr val="000090"/>
+                </a:solidFill>
+              </a:rPr>
               <a:t>West</a:t>
             </a:r>
           </a:p>
           <a:p>
-            <a:r>
-              <a:rPr lang="en-US" dirty="0" smtClean="0"/>
+            <a:pPr>
+              <a:buFont typeface="Wingdings" charset="2"/>
+              <a:buChar char="²"/>
+            </a:pPr>
+            <a:r>
+              <a:rPr lang="en-US" dirty="0">
+                <a:solidFill>
+                  <a:srgbClr val="000090"/>
+                </a:solidFill>
+              </a:rPr>
               <a:t>Up</a:t>
             </a:r>
           </a:p>
           <a:p>
-            <a:r>
-              <a:rPr lang="en-US" dirty="0" smtClean="0"/>
+            <a:pPr>
+              <a:buFont typeface="Wingdings" charset="2"/>
+              <a:buChar char="²"/>
+            </a:pPr>
+            <a:r>
+              <a:rPr lang="en-US" dirty="0">
+                <a:solidFill>
+                  <a:srgbClr val="000090"/>
+                </a:solidFill>
+              </a:rPr>
               <a:t>Down</a:t>
             </a:r>
           </a:p>
           <a:p>
-            <a:endParaRPr lang="en-US" dirty="0" smtClean="0"/>
+            <a:endParaRPr lang="en-US" dirty="0"/>
+          </a:p>
+          <a:p>
+            <a:r>
+              <a:rPr lang="en-US" dirty="0">
+                <a:solidFill>
+                  <a:srgbClr val="000000"/>
+                </a:solidFill>
+              </a:rPr>
+              <a:t>The Keys and locked Doors</a:t>
+            </a:r>
+            <a:r>
+              <a:rPr lang="en-US" dirty="0" smtClean="0">
+                <a:solidFill>
+                  <a:srgbClr val="000000"/>
+                </a:solidFill>
+              </a:rPr>
+              <a:t>:</a:t>
+            </a:r>
           </a:p>
           <a:p>
             <a:pPr marL="114300" indent="0">
               <a:buNone/>
             </a:pPr>
+            <a:endParaRPr lang="en-US" dirty="0">
+              <a:solidFill>
+                <a:srgbClr val="000090"/>
+              </a:solidFill>
+            </a:endParaRPr>
+          </a:p>
+          <a:p>
+            <a:pPr>
+              <a:buFontTx/>
+              <a:buChar char="-"/>
+            </a:pPr>
+            <a:r>
+              <a:rPr lang="en-US" dirty="0" smtClean="0">
+                <a:solidFill>
+                  <a:srgbClr val="000090"/>
+                </a:solidFill>
+              </a:rPr>
+              <a:t>You </a:t>
+            </a:r>
             <a:r>
               <a:rPr lang="en-US" dirty="0">
                 <a:solidFill>
-                  <a:schemeClr val="tx1"/>
+                  <a:srgbClr val="000090"/>
                 </a:solidFill>
               </a:rPr>
-              <a:t>The Keys and locked Doors:</a:t>
+              <a:t>can unlock the doors to gain access to more </a:t>
+            </a:r>
+            <a:r>
+              <a:rPr lang="en-US" dirty="0" smtClean="0">
+                <a:solidFill>
+                  <a:srgbClr val="000090"/>
+                </a:solidFill>
+              </a:rPr>
+              <a:t>areas.</a:t>
             </a:r>
           </a:p>
           <a:p>
             <a:pPr marL="114300" indent="0">
               <a:buNone/>
             </a:pPr>
-            <a:r>
-              <a:rPr lang="en-US" dirty="0"/>
-              <a:t>- You can unlock the doors to gain access to more </a:t>
-            </a:r>
-            <a:r>
-              <a:rPr lang="en-US" dirty="0" smtClean="0"/>
-              <a:t>areas</a:t>
-            </a:r>
-            <a:endParaRPr lang="en-US" dirty="0"/>
+            <a:endParaRPr lang="en-US" dirty="0">
+              <a:solidFill>
+                <a:srgbClr val="000090"/>
+              </a:solidFill>
+            </a:endParaRPr>
           </a:p>
           <a:p>
             <a:pPr marL="114300" indent="0">
               <a:buNone/>
             </a:pPr>
             <a:r>
-              <a:rPr lang="en-US" dirty="0" smtClean="0"/>
-              <a:t>-You can’t move into a room if there is a locked door</a:t>
-            </a:r>
-            <a:endParaRPr lang="en-US" dirty="0"/>
+              <a:rPr lang="en-US" dirty="0" smtClean="0">
+                <a:solidFill>
+                  <a:srgbClr val="000090"/>
+                </a:solidFill>
+              </a:rPr>
+              <a:t>-</a:t>
+            </a:r>
+            <a:r>
+              <a:rPr lang="en-US" dirty="0">
+                <a:solidFill>
+                  <a:srgbClr val="000090"/>
+                </a:solidFill>
+              </a:rPr>
+              <a:t>You can’t move into a room if there is a locked </a:t>
+            </a:r>
+            <a:r>
+              <a:rPr lang="en-US" dirty="0" smtClean="0">
+                <a:solidFill>
+                  <a:srgbClr val="000090"/>
+                </a:solidFill>
+              </a:rPr>
+              <a:t>door.</a:t>
+            </a:r>
           </a:p>
           <a:p>
             <a:pPr marL="114300" indent="0">
               <a:buNone/>
             </a:pPr>
-            <a:r>
-              <a:rPr lang="en-US" dirty="0" smtClean="0"/>
-              <a:t>-You’ll have to search for keys</a:t>
-            </a:r>
-            <a:endParaRPr lang="en-US" dirty="0" smtClean="0"/>
+            <a:endParaRPr lang="en-US" dirty="0">
+              <a:solidFill>
+                <a:srgbClr val="000090"/>
+              </a:solidFill>
+            </a:endParaRPr>
+          </a:p>
+          <a:p>
+            <a:pPr marL="114300" indent="0">
+              <a:buNone/>
+            </a:pPr>
+            <a:r>
+              <a:rPr lang="en-US" dirty="0">
+                <a:solidFill>
+                  <a:srgbClr val="000090"/>
+                </a:solidFill>
+              </a:rPr>
+              <a:t>-You’ll have to search for </a:t>
+            </a:r>
+            <a:r>
+              <a:rPr lang="en-US" dirty="0" smtClean="0">
+                <a:solidFill>
+                  <a:srgbClr val="000090"/>
+                </a:solidFill>
+              </a:rPr>
+              <a:t>keys.</a:t>
+            </a:r>
+            <a:endParaRPr lang="en-US" dirty="0">
+              <a:solidFill>
+                <a:srgbClr val="000090"/>
+              </a:solidFill>
+            </a:endParaRPr>
           </a:p>
         </p:txBody>
       </p:sp>
@@ -7896,7 +8264,7 @@
               </a:rPr>
               <a:t>The Movement of the Players</a:t>
             </a:r>
-            <a:endParaRPr lang="ar-SA" sz="4000" dirty="0" smtClean="0">
+            <a:endParaRPr lang="x-none" sz="4000" dirty="0" smtClean="0">
               <a:solidFill>
                 <a:srgbClr val="000000"/>
               </a:solidFill>
@@ -7919,7 +8287,443 @@
   <p:timing>
     <p:tnLst>
       <p:par>
-        <p:cTn id="1" dur="indefinite" restart="never" nodeType="tmRoot"/>
+        <p:cTn id="1" dur="indefinite" restart="never" nodeType="tmRoot">
+          <p:childTnLst>
+            <p:seq concurrent="1" nextAc="seek">
+              <p:cTn id="2" dur="indefinite" nodeType="mainSeq">
+                <p:childTnLst>
+                  <p:par>
+                    <p:cTn id="3" fill="hold">
+                      <p:stCondLst>
+                        <p:cond delay="indefinite"/>
+                      </p:stCondLst>
+                      <p:childTnLst>
+                        <p:par>
+                          <p:cTn id="4" fill="hold">
+                            <p:stCondLst>
+                              <p:cond delay="0"/>
+                            </p:stCondLst>
+                            <p:childTnLst>
+                              <p:par>
+                                <p:cTn id="5" presetID="1" presetClass="entr" presetSubtype="0" fill="hold" nodeType="clickEffect">
+                                  <p:stCondLst>
+                                    <p:cond delay="0"/>
+                                  </p:stCondLst>
+                                  <p:childTnLst>
+                                    <p:set>
+                                      <p:cBhvr>
+                                        <p:cTn id="6" dur="1" fill="hold">
+                                          <p:stCondLst>
+                                            <p:cond delay="0"/>
+                                          </p:stCondLst>
+                                        </p:cTn>
+                                        <p:tgtEl>
+                                          <p:spTgt spid="3">
+                                            <p:txEl>
+                                              <p:pRg st="0" end="0"/>
+                                            </p:txEl>
+                                          </p:spTgt>
+                                        </p:tgtEl>
+                                        <p:attrNameLst>
+                                          <p:attrName>style.visibility</p:attrName>
+                                        </p:attrNameLst>
+                                      </p:cBhvr>
+                                      <p:to>
+                                        <p:strVal val="visible"/>
+                                      </p:to>
+                                    </p:set>
+                                  </p:childTnLst>
+                                </p:cTn>
+                              </p:par>
+                            </p:childTnLst>
+                          </p:cTn>
+                        </p:par>
+                      </p:childTnLst>
+                    </p:cTn>
+                  </p:par>
+                  <p:par>
+                    <p:cTn id="7" fill="hold">
+                      <p:stCondLst>
+                        <p:cond delay="indefinite"/>
+                      </p:stCondLst>
+                      <p:childTnLst>
+                        <p:par>
+                          <p:cTn id="8" fill="hold">
+                            <p:stCondLst>
+                              <p:cond delay="0"/>
+                            </p:stCondLst>
+                            <p:childTnLst>
+                              <p:par>
+                                <p:cTn id="9" presetID="1" presetClass="entr" presetSubtype="0" fill="hold" nodeType="clickEffect">
+                                  <p:stCondLst>
+                                    <p:cond delay="0"/>
+                                  </p:stCondLst>
+                                  <p:childTnLst>
+                                    <p:set>
+                                      <p:cBhvr>
+                                        <p:cTn id="10" dur="1" fill="hold">
+                                          <p:stCondLst>
+                                            <p:cond delay="0"/>
+                                          </p:stCondLst>
+                                        </p:cTn>
+                                        <p:tgtEl>
+                                          <p:spTgt spid="3">
+                                            <p:txEl>
+                                              <p:pRg st="2" end="2"/>
+                                            </p:txEl>
+                                          </p:spTgt>
+                                        </p:tgtEl>
+                                        <p:attrNameLst>
+                                          <p:attrName>style.visibility</p:attrName>
+                                        </p:attrNameLst>
+                                      </p:cBhvr>
+                                      <p:to>
+                                        <p:strVal val="visible"/>
+                                      </p:to>
+                                    </p:set>
+                                  </p:childTnLst>
+                                </p:cTn>
+                              </p:par>
+                              <p:par>
+                                <p:cTn id="11" presetID="1" presetClass="entr" presetSubtype="0" fill="hold" nodeType="withEffect">
+                                  <p:stCondLst>
+                                    <p:cond delay="0"/>
+                                  </p:stCondLst>
+                                  <p:childTnLst>
+                                    <p:set>
+                                      <p:cBhvr>
+                                        <p:cTn id="12" dur="1" fill="hold">
+                                          <p:stCondLst>
+                                            <p:cond delay="0"/>
+                                          </p:stCondLst>
+                                        </p:cTn>
+                                        <p:tgtEl>
+                                          <p:spTgt spid="3">
+                                            <p:txEl>
+                                              <p:pRg st="3" end="3"/>
+                                            </p:txEl>
+                                          </p:spTgt>
+                                        </p:tgtEl>
+                                        <p:attrNameLst>
+                                          <p:attrName>style.visibility</p:attrName>
+                                        </p:attrNameLst>
+                                      </p:cBhvr>
+                                      <p:to>
+                                        <p:strVal val="visible"/>
+                                      </p:to>
+                                    </p:set>
+                                  </p:childTnLst>
+                                </p:cTn>
+                              </p:par>
+                              <p:par>
+                                <p:cTn id="13" presetID="1" presetClass="entr" presetSubtype="0" fill="hold" nodeType="withEffect">
+                                  <p:stCondLst>
+                                    <p:cond delay="0"/>
+                                  </p:stCondLst>
+                                  <p:childTnLst>
+                                    <p:set>
+                                      <p:cBhvr>
+                                        <p:cTn id="14" dur="1" fill="hold">
+                                          <p:stCondLst>
+                                            <p:cond delay="0"/>
+                                          </p:stCondLst>
+                                        </p:cTn>
+                                        <p:tgtEl>
+                                          <p:spTgt spid="3">
+                                            <p:txEl>
+                                              <p:pRg st="4" end="4"/>
+                                            </p:txEl>
+                                          </p:spTgt>
+                                        </p:tgtEl>
+                                        <p:attrNameLst>
+                                          <p:attrName>style.visibility</p:attrName>
+                                        </p:attrNameLst>
+                                      </p:cBhvr>
+                                      <p:to>
+                                        <p:strVal val="visible"/>
+                                      </p:to>
+                                    </p:set>
+                                  </p:childTnLst>
+                                </p:cTn>
+                              </p:par>
+                              <p:par>
+                                <p:cTn id="15" presetID="1" presetClass="entr" presetSubtype="0" fill="hold" nodeType="withEffect">
+                                  <p:stCondLst>
+                                    <p:cond delay="0"/>
+                                  </p:stCondLst>
+                                  <p:childTnLst>
+                                    <p:set>
+                                      <p:cBhvr>
+                                        <p:cTn id="16" dur="1" fill="hold">
+                                          <p:stCondLst>
+                                            <p:cond delay="0"/>
+                                          </p:stCondLst>
+                                        </p:cTn>
+                                        <p:tgtEl>
+                                          <p:spTgt spid="3">
+                                            <p:txEl>
+                                              <p:pRg st="5" end="5"/>
+                                            </p:txEl>
+                                          </p:spTgt>
+                                        </p:tgtEl>
+                                        <p:attrNameLst>
+                                          <p:attrName>style.visibility</p:attrName>
+                                        </p:attrNameLst>
+                                      </p:cBhvr>
+                                      <p:to>
+                                        <p:strVal val="visible"/>
+                                      </p:to>
+                                    </p:set>
+                                  </p:childTnLst>
+                                </p:cTn>
+                              </p:par>
+                              <p:par>
+                                <p:cTn id="17" presetID="1" presetClass="entr" presetSubtype="0" fill="hold" nodeType="withEffect">
+                                  <p:stCondLst>
+                                    <p:cond delay="0"/>
+                                  </p:stCondLst>
+                                  <p:childTnLst>
+                                    <p:set>
+                                      <p:cBhvr>
+                                        <p:cTn id="18" dur="1" fill="hold">
+                                          <p:stCondLst>
+                                            <p:cond delay="0"/>
+                                          </p:stCondLst>
+                                        </p:cTn>
+                                        <p:tgtEl>
+                                          <p:spTgt spid="3">
+                                            <p:txEl>
+                                              <p:pRg st="6" end="6"/>
+                                            </p:txEl>
+                                          </p:spTgt>
+                                        </p:tgtEl>
+                                        <p:attrNameLst>
+                                          <p:attrName>style.visibility</p:attrName>
+                                        </p:attrNameLst>
+                                      </p:cBhvr>
+                                      <p:to>
+                                        <p:strVal val="visible"/>
+                                      </p:to>
+                                    </p:set>
+                                  </p:childTnLst>
+                                </p:cTn>
+                              </p:par>
+                              <p:par>
+                                <p:cTn id="19" presetID="1" presetClass="entr" presetSubtype="0" fill="hold" nodeType="withEffect">
+                                  <p:stCondLst>
+                                    <p:cond delay="0"/>
+                                  </p:stCondLst>
+                                  <p:childTnLst>
+                                    <p:set>
+                                      <p:cBhvr>
+                                        <p:cTn id="20" dur="1" fill="hold">
+                                          <p:stCondLst>
+                                            <p:cond delay="0"/>
+                                          </p:stCondLst>
+                                        </p:cTn>
+                                        <p:tgtEl>
+                                          <p:spTgt spid="3">
+                                            <p:txEl>
+                                              <p:pRg st="7" end="7"/>
+                                            </p:txEl>
+                                          </p:spTgt>
+                                        </p:tgtEl>
+                                        <p:attrNameLst>
+                                          <p:attrName>style.visibility</p:attrName>
+                                        </p:attrNameLst>
+                                      </p:cBhvr>
+                                      <p:to>
+                                        <p:strVal val="visible"/>
+                                      </p:to>
+                                    </p:set>
+                                  </p:childTnLst>
+                                </p:cTn>
+                              </p:par>
+                            </p:childTnLst>
+                          </p:cTn>
+                        </p:par>
+                      </p:childTnLst>
+                    </p:cTn>
+                  </p:par>
+                  <p:par>
+                    <p:cTn id="21" fill="hold">
+                      <p:stCondLst>
+                        <p:cond delay="indefinite"/>
+                      </p:stCondLst>
+                      <p:childTnLst>
+                        <p:par>
+                          <p:cTn id="22" fill="hold">
+                            <p:stCondLst>
+                              <p:cond delay="0"/>
+                            </p:stCondLst>
+                            <p:childTnLst>
+                              <p:par>
+                                <p:cTn id="23" presetID="1" presetClass="entr" presetSubtype="0" fill="hold" nodeType="clickEffect">
+                                  <p:stCondLst>
+                                    <p:cond delay="0"/>
+                                  </p:stCondLst>
+                                  <p:childTnLst>
+                                    <p:set>
+                                      <p:cBhvr>
+                                        <p:cTn id="24" dur="1" fill="hold">
+                                          <p:stCondLst>
+                                            <p:cond delay="0"/>
+                                          </p:stCondLst>
+                                        </p:cTn>
+                                        <p:tgtEl>
+                                          <p:spTgt spid="3">
+                                            <p:txEl>
+                                              <p:pRg st="9" end="9"/>
+                                            </p:txEl>
+                                          </p:spTgt>
+                                        </p:tgtEl>
+                                        <p:attrNameLst>
+                                          <p:attrName>style.visibility</p:attrName>
+                                        </p:attrNameLst>
+                                      </p:cBhvr>
+                                      <p:to>
+                                        <p:strVal val="visible"/>
+                                      </p:to>
+                                    </p:set>
+                                  </p:childTnLst>
+                                </p:cTn>
+                              </p:par>
+                            </p:childTnLst>
+                          </p:cTn>
+                        </p:par>
+                      </p:childTnLst>
+                    </p:cTn>
+                  </p:par>
+                  <p:par>
+                    <p:cTn id="25" fill="hold">
+                      <p:stCondLst>
+                        <p:cond delay="indefinite"/>
+                      </p:stCondLst>
+                      <p:childTnLst>
+                        <p:par>
+                          <p:cTn id="26" fill="hold">
+                            <p:stCondLst>
+                              <p:cond delay="0"/>
+                            </p:stCondLst>
+                            <p:childTnLst>
+                              <p:par>
+                                <p:cTn id="27" presetID="1" presetClass="entr" presetSubtype="0" fill="hold" nodeType="clickEffect">
+                                  <p:stCondLst>
+                                    <p:cond delay="0"/>
+                                  </p:stCondLst>
+                                  <p:childTnLst>
+                                    <p:set>
+                                      <p:cBhvr>
+                                        <p:cTn id="28" dur="1" fill="hold">
+                                          <p:stCondLst>
+                                            <p:cond delay="0"/>
+                                          </p:stCondLst>
+                                        </p:cTn>
+                                        <p:tgtEl>
+                                          <p:spTgt spid="3">
+                                            <p:txEl>
+                                              <p:pRg st="11" end="11"/>
+                                            </p:txEl>
+                                          </p:spTgt>
+                                        </p:tgtEl>
+                                        <p:attrNameLst>
+                                          <p:attrName>style.visibility</p:attrName>
+                                        </p:attrNameLst>
+                                      </p:cBhvr>
+                                      <p:to>
+                                        <p:strVal val="visible"/>
+                                      </p:to>
+                                    </p:set>
+                                  </p:childTnLst>
+                                </p:cTn>
+                              </p:par>
+                              <p:par>
+                                <p:cTn id="29" presetID="1" presetClass="entr" presetSubtype="0" fill="hold" nodeType="withEffect">
+                                  <p:stCondLst>
+                                    <p:cond delay="0"/>
+                                  </p:stCondLst>
+                                  <p:childTnLst>
+                                    <p:set>
+                                      <p:cBhvr>
+                                        <p:cTn id="30" dur="1" fill="hold">
+                                          <p:stCondLst>
+                                            <p:cond delay="0"/>
+                                          </p:stCondLst>
+                                        </p:cTn>
+                                        <p:tgtEl>
+                                          <p:spTgt spid="3">
+                                            <p:txEl>
+                                              <p:pRg st="13" end="13"/>
+                                            </p:txEl>
+                                          </p:spTgt>
+                                        </p:tgtEl>
+                                        <p:attrNameLst>
+                                          <p:attrName>style.visibility</p:attrName>
+                                        </p:attrNameLst>
+                                      </p:cBhvr>
+                                      <p:to>
+                                        <p:strVal val="visible"/>
+                                      </p:to>
+                                    </p:set>
+                                  </p:childTnLst>
+                                </p:cTn>
+                              </p:par>
+                              <p:par>
+                                <p:cTn id="31" presetID="1" presetClass="entr" presetSubtype="0" fill="hold" nodeType="withEffect">
+                                  <p:stCondLst>
+                                    <p:cond delay="0"/>
+                                  </p:stCondLst>
+                                  <p:childTnLst>
+                                    <p:set>
+                                      <p:cBhvr>
+                                        <p:cTn id="32" dur="1" fill="hold">
+                                          <p:stCondLst>
+                                            <p:cond delay="0"/>
+                                          </p:stCondLst>
+                                        </p:cTn>
+                                        <p:tgtEl>
+                                          <p:spTgt spid="3">
+                                            <p:txEl>
+                                              <p:pRg st="15" end="15"/>
+                                            </p:txEl>
+                                          </p:spTgt>
+                                        </p:tgtEl>
+                                        <p:attrNameLst>
+                                          <p:attrName>style.visibility</p:attrName>
+                                        </p:attrNameLst>
+                                      </p:cBhvr>
+                                      <p:to>
+                                        <p:strVal val="visible"/>
+                                      </p:to>
+                                    </p:set>
+                                  </p:childTnLst>
+                                </p:cTn>
+                              </p:par>
+                            </p:childTnLst>
+                          </p:cTn>
+                        </p:par>
+                      </p:childTnLst>
+                    </p:cTn>
+                  </p:par>
+                </p:childTnLst>
+              </p:cTn>
+              <p:prevCondLst>
+                <p:cond evt="onPrev" delay="0">
+                  <p:tgtEl>
+                    <p:sldTgt/>
+                  </p:tgtEl>
+                </p:cond>
+              </p:prevCondLst>
+              <p:nextCondLst>
+                <p:cond evt="onNext" delay="0">
+                  <p:tgtEl>
+                    <p:sldTgt/>
+                  </p:tgtEl>
+                </p:cond>
+              </p:nextCondLst>
+            </p:seq>
+          </p:childTnLst>
+        </p:cTn>
       </p:par>
     </p:tnLst>
   </p:timing>
@@ -8005,6 +8809,14 @@
               <a:buNone/>
             </a:pPr>
             <a:r>
+              <a:rPr lang="en-US" dirty="0">
+                <a:solidFill>
+                  <a:srgbClr val="000090"/>
+                </a:solidFill>
+              </a:rPr>
+              <a:t> </a:t>
+            </a:r>
+            <a:r>
               <a:rPr lang="en-US" dirty="0" smtClean="0">
                 <a:solidFill>
                   <a:srgbClr val="000090"/>
@@ -8143,7 +8955,16 @@
                   <a:srgbClr val="000090"/>
                 </a:solidFill>
               </a:rPr>
-              <a:t>Lamp + torch</a:t>
+              <a:t>Helps </a:t>
+            </a:r>
+            <a:r>
+              <a:rPr lang="en-GB" dirty="0" smtClean="0">
+                <a:solidFill>
+                  <a:srgbClr val="000090"/>
+                </a:solidFill>
+                <a:sym typeface="Wingdings"/>
+              </a:rPr>
+              <a:t> Vision “Dark rooms”</a:t>
             </a:r>
           </a:p>
           <a:p>
@@ -8152,22 +8973,12 @@
               <a:buChar char="-"/>
             </a:pPr>
             <a:r>
-              <a:rPr lang="en-GB" dirty="0" smtClean="0">
+              <a:rPr lang="en-GB" dirty="0">
                 <a:solidFill>
                   <a:srgbClr val="000090"/>
                 </a:solidFill>
-                <a:sym typeface="Wingdings"/>
               </a:rPr>
-              <a:t>Lamp </a:t>
-            </a:r>
-            <a:r>
-              <a:rPr lang="en-US" dirty="0" smtClean="0">
-                <a:solidFill>
-                  <a:srgbClr val="000090"/>
-                </a:solidFill>
-                <a:sym typeface="Wingdings"/>
-              </a:rPr>
-              <a:t> see doors and searchable objects</a:t>
+              <a:t>Lamp + torch</a:t>
             </a:r>
           </a:p>
           <a:p>
@@ -8176,24 +8987,33 @@
               <a:buChar char="-"/>
             </a:pPr>
             <a:r>
-              <a:rPr lang="en-US" dirty="0">
+              <a:rPr lang="en-GB" dirty="0">
                 <a:solidFill>
                   <a:srgbClr val="000090"/>
                 </a:solidFill>
                 <a:sym typeface="Wingdings"/>
               </a:rPr>
-              <a:t>Torch </a:t>
-            </a:r>
-            <a:r>
-              <a:rPr lang="en-US" dirty="0" smtClean="0">
+              <a:t>Lamp </a:t>
+            </a:r>
+            <a:r>
+              <a:rPr lang="en-US" dirty="0">
                 <a:solidFill>
                   <a:srgbClr val="000090"/>
                 </a:solidFill>
                 <a:sym typeface="Wingdings"/>
               </a:rPr>
-              <a:t> adds the ability to see items on the floor</a:t>
-            </a:r>
-            <a:endParaRPr lang="en-GB" dirty="0" smtClean="0">
+              <a:t> see doors and searchable </a:t>
+            </a:r>
+            <a:r>
+              <a:rPr lang="en-US" dirty="0" smtClean="0">
+                <a:solidFill>
+                  <a:srgbClr val="000090"/>
+                </a:solidFill>
+                <a:sym typeface="Wingdings"/>
+              </a:rPr>
+              <a:t>objects.</a:t>
+            </a:r>
+            <a:endParaRPr lang="en-US" dirty="0">
               <a:solidFill>
                 <a:srgbClr val="000090"/>
               </a:solidFill>
@@ -8204,6 +9024,41 @@
             <a:pPr>
               <a:buFontTx/>
               <a:buChar char="-"/>
+            </a:pPr>
+            <a:r>
+              <a:rPr lang="en-US" dirty="0">
+                <a:solidFill>
+                  <a:srgbClr val="000090"/>
+                </a:solidFill>
+                <a:sym typeface="Wingdings"/>
+              </a:rPr>
+              <a:t>Torch  adds the ability to see items on the </a:t>
+            </a:r>
+            <a:r>
+              <a:rPr lang="en-US" dirty="0" smtClean="0">
+                <a:solidFill>
+                  <a:srgbClr val="000090"/>
+                </a:solidFill>
+                <a:sym typeface="Wingdings"/>
+              </a:rPr>
+              <a:t>floor.</a:t>
+            </a:r>
+            <a:endParaRPr lang="en-GB" dirty="0">
+              <a:solidFill>
+                <a:srgbClr val="000090"/>
+              </a:solidFill>
+              <a:sym typeface="Wingdings"/>
+            </a:endParaRPr>
+          </a:p>
+          <a:p>
+            <a:pPr marL="114300" indent="0">
+              <a:buNone/>
+            </a:pPr>
+            <a:endParaRPr lang="en-US" dirty="0" smtClean="0"/>
+          </a:p>
+          <a:p>
+            <a:pPr marL="114300" indent="0">
+              <a:buNone/>
             </a:pPr>
             <a:endParaRPr lang="en-US" dirty="0" smtClean="0"/>
           </a:p>
@@ -8243,7 +9098,7 @@
               <a:t>Features</a:t>
             </a:r>
             <a:r>
-              <a:rPr lang="ar-SA" sz="4000" dirty="0" smtClean="0">
+              <a:rPr lang="x-none" sz="4000" dirty="0" smtClean="0">
                 <a:solidFill>
                   <a:srgbClr val="000000"/>
                 </a:solidFill>
@@ -8262,7 +9117,7 @@
               </a:rPr>
               <a:t>of  the Haunted House</a:t>
             </a:r>
-            <a:endParaRPr lang="ar-SA" sz="4000" dirty="0" smtClean="0">
+            <a:endParaRPr lang="x-none" sz="4000" dirty="0" smtClean="0">
               <a:solidFill>
                 <a:srgbClr val="000000"/>
               </a:solidFill>
@@ -8285,7 +9140,546 @@
   <p:timing>
     <p:tnLst>
       <p:par>
-        <p:cTn id="1" dur="indefinite" restart="never" nodeType="tmRoot"/>
+        <p:cTn id="1" dur="indefinite" restart="never" nodeType="tmRoot">
+          <p:childTnLst>
+            <p:seq concurrent="1" nextAc="seek">
+              <p:cTn id="2" dur="indefinite" nodeType="mainSeq">
+                <p:childTnLst>
+                  <p:par>
+                    <p:cTn id="3" fill="hold">
+                      <p:stCondLst>
+                        <p:cond delay="indefinite"/>
+                      </p:stCondLst>
+                      <p:childTnLst>
+                        <p:par>
+                          <p:cTn id="4" fill="hold">
+                            <p:stCondLst>
+                              <p:cond delay="0"/>
+                            </p:stCondLst>
+                            <p:childTnLst>
+                              <p:par>
+                                <p:cTn id="5" presetID="1" presetClass="entr" presetSubtype="0" fill="hold" nodeType="clickEffect">
+                                  <p:stCondLst>
+                                    <p:cond delay="0"/>
+                                  </p:stCondLst>
+                                  <p:childTnLst>
+                                    <p:set>
+                                      <p:cBhvr>
+                                        <p:cTn id="6" dur="1" fill="hold">
+                                          <p:stCondLst>
+                                            <p:cond delay="0"/>
+                                          </p:stCondLst>
+                                        </p:cTn>
+                                        <p:tgtEl>
+                                          <p:spTgt spid="3">
+                                            <p:txEl>
+                                              <p:pRg st="0" end="0"/>
+                                            </p:txEl>
+                                          </p:spTgt>
+                                        </p:tgtEl>
+                                        <p:attrNameLst>
+                                          <p:attrName>style.visibility</p:attrName>
+                                        </p:attrNameLst>
+                                      </p:cBhvr>
+                                      <p:to>
+                                        <p:strVal val="visible"/>
+                                      </p:to>
+                                    </p:set>
+                                  </p:childTnLst>
+                                </p:cTn>
+                              </p:par>
+                            </p:childTnLst>
+                          </p:cTn>
+                        </p:par>
+                      </p:childTnLst>
+                    </p:cTn>
+                  </p:par>
+                  <p:par>
+                    <p:cTn id="7" fill="hold">
+                      <p:stCondLst>
+                        <p:cond delay="indefinite"/>
+                      </p:stCondLst>
+                      <p:childTnLst>
+                        <p:par>
+                          <p:cTn id="8" fill="hold">
+                            <p:stCondLst>
+                              <p:cond delay="0"/>
+                            </p:stCondLst>
+                            <p:childTnLst>
+                              <p:par>
+                                <p:cTn id="9" presetID="1" presetClass="entr" presetSubtype="0" fill="hold" nodeType="clickEffect">
+                                  <p:stCondLst>
+                                    <p:cond delay="0"/>
+                                  </p:stCondLst>
+                                  <p:childTnLst>
+                                    <p:set>
+                                      <p:cBhvr>
+                                        <p:cTn id="10" dur="1" fill="hold">
+                                          <p:stCondLst>
+                                            <p:cond delay="0"/>
+                                          </p:stCondLst>
+                                        </p:cTn>
+                                        <p:tgtEl>
+                                          <p:spTgt spid="3">
+                                            <p:txEl>
+                                              <p:pRg st="2" end="2"/>
+                                            </p:txEl>
+                                          </p:spTgt>
+                                        </p:tgtEl>
+                                        <p:attrNameLst>
+                                          <p:attrName>style.visibility</p:attrName>
+                                        </p:attrNameLst>
+                                      </p:cBhvr>
+                                      <p:to>
+                                        <p:strVal val="visible"/>
+                                      </p:to>
+                                    </p:set>
+                                  </p:childTnLst>
+                                </p:cTn>
+                              </p:par>
+                            </p:childTnLst>
+                          </p:cTn>
+                        </p:par>
+                      </p:childTnLst>
+                    </p:cTn>
+                  </p:par>
+                  <p:par>
+                    <p:cTn id="11" fill="hold">
+                      <p:stCondLst>
+                        <p:cond delay="indefinite"/>
+                      </p:stCondLst>
+                      <p:childTnLst>
+                        <p:par>
+                          <p:cTn id="12" fill="hold">
+                            <p:stCondLst>
+                              <p:cond delay="0"/>
+                            </p:stCondLst>
+                            <p:childTnLst>
+                              <p:par>
+                                <p:cTn id="13" presetID="1" presetClass="entr" presetSubtype="0" fill="hold" nodeType="clickEffect">
+                                  <p:stCondLst>
+                                    <p:cond delay="0"/>
+                                  </p:stCondLst>
+                                  <p:childTnLst>
+                                    <p:set>
+                                      <p:cBhvr>
+                                        <p:cTn id="14" dur="1" fill="hold">
+                                          <p:stCondLst>
+                                            <p:cond delay="0"/>
+                                          </p:stCondLst>
+                                        </p:cTn>
+                                        <p:tgtEl>
+                                          <p:spTgt spid="3">
+                                            <p:txEl>
+                                              <p:pRg st="3" end="3"/>
+                                            </p:txEl>
+                                          </p:spTgt>
+                                        </p:tgtEl>
+                                        <p:attrNameLst>
+                                          <p:attrName>style.visibility</p:attrName>
+                                        </p:attrNameLst>
+                                      </p:cBhvr>
+                                      <p:to>
+                                        <p:strVal val="visible"/>
+                                      </p:to>
+                                    </p:set>
+                                  </p:childTnLst>
+                                </p:cTn>
+                              </p:par>
+                              <p:par>
+                                <p:cTn id="15" presetID="1" presetClass="entr" presetSubtype="0" fill="hold" nodeType="withEffect">
+                                  <p:stCondLst>
+                                    <p:cond delay="0"/>
+                                  </p:stCondLst>
+                                  <p:childTnLst>
+                                    <p:set>
+                                      <p:cBhvr>
+                                        <p:cTn id="16" dur="1" fill="hold">
+                                          <p:stCondLst>
+                                            <p:cond delay="0"/>
+                                          </p:stCondLst>
+                                        </p:cTn>
+                                        <p:tgtEl>
+                                          <p:spTgt spid="3">
+                                            <p:txEl>
+                                              <p:pRg st="4" end="4"/>
+                                            </p:txEl>
+                                          </p:spTgt>
+                                        </p:tgtEl>
+                                        <p:attrNameLst>
+                                          <p:attrName>style.visibility</p:attrName>
+                                        </p:attrNameLst>
+                                      </p:cBhvr>
+                                      <p:to>
+                                        <p:strVal val="visible"/>
+                                      </p:to>
+                                    </p:set>
+                                  </p:childTnLst>
+                                </p:cTn>
+                              </p:par>
+                              <p:par>
+                                <p:cTn id="17" presetID="1" presetClass="entr" presetSubtype="0" fill="hold" nodeType="withEffect">
+                                  <p:stCondLst>
+                                    <p:cond delay="0"/>
+                                  </p:stCondLst>
+                                  <p:childTnLst>
+                                    <p:set>
+                                      <p:cBhvr>
+                                        <p:cTn id="18" dur="1" fill="hold">
+                                          <p:stCondLst>
+                                            <p:cond delay="0"/>
+                                          </p:stCondLst>
+                                        </p:cTn>
+                                        <p:tgtEl>
+                                          <p:spTgt spid="3">
+                                            <p:txEl>
+                                              <p:pRg st="5" end="5"/>
+                                            </p:txEl>
+                                          </p:spTgt>
+                                        </p:tgtEl>
+                                        <p:attrNameLst>
+                                          <p:attrName>style.visibility</p:attrName>
+                                        </p:attrNameLst>
+                                      </p:cBhvr>
+                                      <p:to>
+                                        <p:strVal val="visible"/>
+                                      </p:to>
+                                    </p:set>
+                                  </p:childTnLst>
+                                </p:cTn>
+                              </p:par>
+                              <p:par>
+                                <p:cTn id="19" presetID="1" presetClass="entr" presetSubtype="0" fill="hold" nodeType="withEffect">
+                                  <p:stCondLst>
+                                    <p:cond delay="0"/>
+                                  </p:stCondLst>
+                                  <p:childTnLst>
+                                    <p:set>
+                                      <p:cBhvr>
+                                        <p:cTn id="20" dur="1" fill="hold">
+                                          <p:stCondLst>
+                                            <p:cond delay="0"/>
+                                          </p:stCondLst>
+                                        </p:cTn>
+                                        <p:tgtEl>
+                                          <p:spTgt spid="3">
+                                            <p:txEl>
+                                              <p:pRg st="6" end="6"/>
+                                            </p:txEl>
+                                          </p:spTgt>
+                                        </p:tgtEl>
+                                        <p:attrNameLst>
+                                          <p:attrName>style.visibility</p:attrName>
+                                        </p:attrNameLst>
+                                      </p:cBhvr>
+                                      <p:to>
+                                        <p:strVal val="visible"/>
+                                      </p:to>
+                                    </p:set>
+                                  </p:childTnLst>
+                                </p:cTn>
+                              </p:par>
+                              <p:par>
+                                <p:cTn id="21" presetID="1" presetClass="entr" presetSubtype="0" fill="hold" nodeType="withEffect">
+                                  <p:stCondLst>
+                                    <p:cond delay="0"/>
+                                  </p:stCondLst>
+                                  <p:childTnLst>
+                                    <p:set>
+                                      <p:cBhvr>
+                                        <p:cTn id="22" dur="1" fill="hold">
+                                          <p:stCondLst>
+                                            <p:cond delay="0"/>
+                                          </p:stCondLst>
+                                        </p:cTn>
+                                        <p:tgtEl>
+                                          <p:spTgt spid="3">
+                                            <p:txEl>
+                                              <p:pRg st="7" end="7"/>
+                                            </p:txEl>
+                                          </p:spTgt>
+                                        </p:tgtEl>
+                                        <p:attrNameLst>
+                                          <p:attrName>style.visibility</p:attrName>
+                                        </p:attrNameLst>
+                                      </p:cBhvr>
+                                      <p:to>
+                                        <p:strVal val="visible"/>
+                                      </p:to>
+                                    </p:set>
+                                  </p:childTnLst>
+                                </p:cTn>
+                              </p:par>
+                            </p:childTnLst>
+                          </p:cTn>
+                        </p:par>
+                      </p:childTnLst>
+                    </p:cTn>
+                  </p:par>
+                  <p:par>
+                    <p:cTn id="23" fill="hold">
+                      <p:stCondLst>
+                        <p:cond delay="indefinite"/>
+                      </p:stCondLst>
+                      <p:childTnLst>
+                        <p:par>
+                          <p:cTn id="24" fill="hold">
+                            <p:stCondLst>
+                              <p:cond delay="0"/>
+                            </p:stCondLst>
+                            <p:childTnLst>
+                              <p:par>
+                                <p:cTn id="25" presetID="1" presetClass="entr" presetSubtype="0" fill="hold" nodeType="clickEffect">
+                                  <p:stCondLst>
+                                    <p:cond delay="0"/>
+                                  </p:stCondLst>
+                                  <p:childTnLst>
+                                    <p:set>
+                                      <p:cBhvr>
+                                        <p:cTn id="26" dur="1" fill="hold">
+                                          <p:stCondLst>
+                                            <p:cond delay="0"/>
+                                          </p:stCondLst>
+                                        </p:cTn>
+                                        <p:tgtEl>
+                                          <p:spTgt spid="3">
+                                            <p:txEl>
+                                              <p:pRg st="9" end="9"/>
+                                            </p:txEl>
+                                          </p:spTgt>
+                                        </p:tgtEl>
+                                        <p:attrNameLst>
+                                          <p:attrName>style.visibility</p:attrName>
+                                        </p:attrNameLst>
+                                      </p:cBhvr>
+                                      <p:to>
+                                        <p:strVal val="visible"/>
+                                      </p:to>
+                                    </p:set>
+                                  </p:childTnLst>
+                                </p:cTn>
+                              </p:par>
+                            </p:childTnLst>
+                          </p:cTn>
+                        </p:par>
+                      </p:childTnLst>
+                    </p:cTn>
+                  </p:par>
+                  <p:par>
+                    <p:cTn id="27" fill="hold">
+                      <p:stCondLst>
+                        <p:cond delay="indefinite"/>
+                      </p:stCondLst>
+                      <p:childTnLst>
+                        <p:par>
+                          <p:cTn id="28" fill="hold">
+                            <p:stCondLst>
+                              <p:cond delay="0"/>
+                            </p:stCondLst>
+                            <p:childTnLst>
+                              <p:par>
+                                <p:cTn id="29" presetID="1" presetClass="entr" presetSubtype="0" fill="hold" nodeType="clickEffect">
+                                  <p:stCondLst>
+                                    <p:cond delay="0"/>
+                                  </p:stCondLst>
+                                  <p:childTnLst>
+                                    <p:set>
+                                      <p:cBhvr>
+                                        <p:cTn id="30" dur="1" fill="hold">
+                                          <p:stCondLst>
+                                            <p:cond delay="0"/>
+                                          </p:stCondLst>
+                                        </p:cTn>
+                                        <p:tgtEl>
+                                          <p:spTgt spid="3">
+                                            <p:txEl>
+                                              <p:pRg st="10" end="10"/>
+                                            </p:txEl>
+                                          </p:spTgt>
+                                        </p:tgtEl>
+                                        <p:attrNameLst>
+                                          <p:attrName>style.visibility</p:attrName>
+                                        </p:attrNameLst>
+                                      </p:cBhvr>
+                                      <p:to>
+                                        <p:strVal val="visible"/>
+                                      </p:to>
+                                    </p:set>
+                                  </p:childTnLst>
+                                </p:cTn>
+                              </p:par>
+                            </p:childTnLst>
+                          </p:cTn>
+                        </p:par>
+                      </p:childTnLst>
+                    </p:cTn>
+                  </p:par>
+                  <p:par>
+                    <p:cTn id="31" fill="hold">
+                      <p:stCondLst>
+                        <p:cond delay="indefinite"/>
+                      </p:stCondLst>
+                      <p:childTnLst>
+                        <p:par>
+                          <p:cTn id="32" fill="hold">
+                            <p:stCondLst>
+                              <p:cond delay="0"/>
+                            </p:stCondLst>
+                            <p:childTnLst>
+                              <p:par>
+                                <p:cTn id="33" presetID="1" presetClass="entr" presetSubtype="0" fill="hold" nodeType="clickEffect">
+                                  <p:stCondLst>
+                                    <p:cond delay="0"/>
+                                  </p:stCondLst>
+                                  <p:childTnLst>
+                                    <p:set>
+                                      <p:cBhvr>
+                                        <p:cTn id="34" dur="1" fill="hold">
+                                          <p:stCondLst>
+                                            <p:cond delay="0"/>
+                                          </p:stCondLst>
+                                        </p:cTn>
+                                        <p:tgtEl>
+                                          <p:spTgt spid="3">
+                                            <p:txEl>
+                                              <p:pRg st="11" end="11"/>
+                                            </p:txEl>
+                                          </p:spTgt>
+                                        </p:tgtEl>
+                                        <p:attrNameLst>
+                                          <p:attrName>style.visibility</p:attrName>
+                                        </p:attrNameLst>
+                                      </p:cBhvr>
+                                      <p:to>
+                                        <p:strVal val="visible"/>
+                                      </p:to>
+                                    </p:set>
+                                  </p:childTnLst>
+                                </p:cTn>
+                              </p:par>
+                            </p:childTnLst>
+                          </p:cTn>
+                        </p:par>
+                      </p:childTnLst>
+                    </p:cTn>
+                  </p:par>
+                  <p:par>
+                    <p:cTn id="35" fill="hold">
+                      <p:stCondLst>
+                        <p:cond delay="indefinite"/>
+                      </p:stCondLst>
+                      <p:childTnLst>
+                        <p:par>
+                          <p:cTn id="36" fill="hold">
+                            <p:stCondLst>
+                              <p:cond delay="0"/>
+                            </p:stCondLst>
+                            <p:childTnLst>
+                              <p:par>
+                                <p:cTn id="37" presetID="1" presetClass="entr" presetSubtype="0" fill="hold" nodeType="clickEffect">
+                                  <p:stCondLst>
+                                    <p:cond delay="0"/>
+                                  </p:stCondLst>
+                                  <p:childTnLst>
+                                    <p:set>
+                                      <p:cBhvr>
+                                        <p:cTn id="38" dur="1" fill="hold">
+                                          <p:stCondLst>
+                                            <p:cond delay="0"/>
+                                          </p:stCondLst>
+                                        </p:cTn>
+                                        <p:tgtEl>
+                                          <p:spTgt spid="3">
+                                            <p:txEl>
+                                              <p:pRg st="12" end="12"/>
+                                            </p:txEl>
+                                          </p:spTgt>
+                                        </p:tgtEl>
+                                        <p:attrNameLst>
+                                          <p:attrName>style.visibility</p:attrName>
+                                        </p:attrNameLst>
+                                      </p:cBhvr>
+                                      <p:to>
+                                        <p:strVal val="visible"/>
+                                      </p:to>
+                                    </p:set>
+                                  </p:childTnLst>
+                                </p:cTn>
+                              </p:par>
+                            </p:childTnLst>
+                          </p:cTn>
+                        </p:par>
+                      </p:childTnLst>
+                    </p:cTn>
+                  </p:par>
+                  <p:par>
+                    <p:cTn id="39" fill="hold">
+                      <p:stCondLst>
+                        <p:cond delay="indefinite"/>
+                      </p:stCondLst>
+                      <p:childTnLst>
+                        <p:par>
+                          <p:cTn id="40" fill="hold">
+                            <p:stCondLst>
+                              <p:cond delay="0"/>
+                            </p:stCondLst>
+                            <p:childTnLst>
+                              <p:par>
+                                <p:cTn id="41" presetID="1" presetClass="entr" presetSubtype="0" fill="hold" nodeType="clickEffect">
+                                  <p:stCondLst>
+                                    <p:cond delay="0"/>
+                                  </p:stCondLst>
+                                  <p:childTnLst>
+                                    <p:set>
+                                      <p:cBhvr>
+                                        <p:cTn id="42" dur="1" fill="hold">
+                                          <p:stCondLst>
+                                            <p:cond delay="0"/>
+                                          </p:stCondLst>
+                                        </p:cTn>
+                                        <p:tgtEl>
+                                          <p:spTgt spid="3">
+                                            <p:txEl>
+                                              <p:pRg st="13" end="13"/>
+                                            </p:txEl>
+                                          </p:spTgt>
+                                        </p:tgtEl>
+                                        <p:attrNameLst>
+                                          <p:attrName>style.visibility</p:attrName>
+                                        </p:attrNameLst>
+                                      </p:cBhvr>
+                                      <p:to>
+                                        <p:strVal val="visible"/>
+                                      </p:to>
+                                    </p:set>
+                                  </p:childTnLst>
+                                </p:cTn>
+                              </p:par>
+                            </p:childTnLst>
+                          </p:cTn>
+                        </p:par>
+                      </p:childTnLst>
+                    </p:cTn>
+                  </p:par>
+                </p:childTnLst>
+              </p:cTn>
+              <p:prevCondLst>
+                <p:cond evt="onPrev" delay="0">
+                  <p:tgtEl>
+                    <p:sldTgt/>
+                  </p:tgtEl>
+                </p:cond>
+              </p:prevCondLst>
+              <p:nextCondLst>
+                <p:cond evt="onNext" delay="0">
+                  <p:tgtEl>
+                    <p:sldTgt/>
+                  </p:tgtEl>
+                </p:cond>
+              </p:nextCondLst>
+            </p:seq>
+          </p:childTnLst>
+        </p:cTn>
       </p:par>
     </p:tnLst>
   </p:timing>
@@ -8322,100 +9716,76 @@
         <p:spPr/>
         <p:txBody>
           <a:bodyPr>
-            <a:normAutofit/>
+            <a:normAutofit lnSpcReduction="10000"/>
           </a:bodyPr>
           <a:lstStyle/>
           <a:p>
             <a:r>
+              <a:rPr lang="en-US" dirty="0">
+                <a:solidFill>
+                  <a:srgbClr val="000000"/>
+                </a:solidFill>
+              </a:rPr>
+              <a:t>Searchable </a:t>
+            </a:r>
+            <a:r>
               <a:rPr lang="en-US" dirty="0" smtClean="0">
                 <a:solidFill>
                   <a:srgbClr val="000000"/>
                 </a:solidFill>
               </a:rPr>
-              <a:t>Searchable objects:</a:t>
-            </a:r>
-            <a:endParaRPr lang="en-US" dirty="0" smtClean="0">
-              <a:solidFill>
-                <a:srgbClr val="000000"/>
-              </a:solidFill>
-            </a:endParaRPr>
+              <a:t>Objects</a:t>
+            </a:r>
+            <a:r>
+              <a:rPr lang="en-US" dirty="0">
+                <a:solidFill>
+                  <a:srgbClr val="000000"/>
+                </a:solidFill>
+              </a:rPr>
+              <a:t>:</a:t>
+            </a:r>
           </a:p>
           <a:p>
             <a:pPr marL="114300" indent="0">
               <a:buNone/>
             </a:pPr>
             <a:r>
+              <a:rPr lang="en-US" dirty="0">
+                <a:solidFill>
+                  <a:srgbClr val="000090"/>
+                </a:solidFill>
+              </a:rPr>
+              <a:t>- </a:t>
+            </a:r>
+            <a:r>
               <a:rPr lang="en-US" dirty="0" smtClean="0">
                 <a:solidFill>
-                  <a:srgbClr val="000000"/>
+                  <a:srgbClr val="000090"/>
                 </a:solidFill>
               </a:rPr>
-              <a:t>- they have different items that will help the player</a:t>
-            </a:r>
-          </a:p>
-          <a:p>
-            <a:pPr marL="114300" indent="0">
-              <a:buNone/>
-            </a:pPr>
+              <a:t>They </a:t>
+            </a:r>
+            <a:r>
+              <a:rPr lang="en-US" dirty="0">
+                <a:solidFill>
+                  <a:srgbClr val="000090"/>
+                </a:solidFill>
+              </a:rPr>
+              <a:t>have different items that will help the </a:t>
+            </a:r>
             <a:r>
               <a:rPr lang="en-US" dirty="0" smtClean="0">
                 <a:solidFill>
-                  <a:srgbClr val="000000"/>
+                  <a:srgbClr val="000090"/>
                 </a:solidFill>
               </a:rPr>
-              <a:t>- you can find keys and swords in there</a:t>
-            </a:r>
-          </a:p>
-          <a:p>
-            <a:r>
-              <a:rPr lang="en-US" dirty="0" smtClean="0">
-                <a:solidFill>
-                  <a:srgbClr val="000000"/>
-                </a:solidFill>
-              </a:rPr>
-              <a:t>Secrets:</a:t>
-            </a:r>
-          </a:p>
-          <a:p>
-            <a:pPr marL="114300" indent="0">
-              <a:buNone/>
-            </a:pPr>
-            <a:r>
-              <a:rPr lang="en-US" dirty="0" smtClean="0">
-                <a:solidFill>
-                  <a:srgbClr val="000000"/>
-                </a:solidFill>
-              </a:rPr>
-              <a:t>-Secret room in the basement</a:t>
-            </a:r>
-            <a:endParaRPr lang="en-US" dirty="0" smtClean="0">
+              <a:t>player.</a:t>
+            </a:r>
+            <a:endParaRPr lang="en-US" dirty="0">
               <a:solidFill>
-                <a:srgbClr val="000000"/>
+                <a:srgbClr val="000090"/>
               </a:solidFill>
             </a:endParaRPr>
-          </a:p>
-          <a:p>
-            <a:pPr marL="114300" indent="0">
-              <a:buNone/>
-            </a:pPr>
-            <a:r>
-              <a:rPr lang="en-US" dirty="0" smtClean="0">
-                <a:solidFill>
-                  <a:srgbClr val="000000"/>
-                </a:solidFill>
-              </a:rPr>
-              <a:t>-</a:t>
-            </a:r>
-          </a:p>
-          <a:p>
-            <a:r>
-              <a:rPr lang="en-US" dirty="0" smtClean="0">
-                <a:solidFill>
-                  <a:srgbClr val="000000"/>
-                </a:solidFill>
-              </a:rPr>
-              <a:t>Status Window:</a:t>
-            </a:r>
           </a:p>
           <a:p>
             <a:pPr>
@@ -8425,28 +9795,33 @@
             <a:r>
               <a:rPr lang="en-US" dirty="0" smtClean="0">
                 <a:solidFill>
-                  <a:srgbClr val="000000"/>
+                  <a:srgbClr val="000090"/>
                 </a:solidFill>
               </a:rPr>
-              <a:t>allows curses </a:t>
+              <a:t>You </a:t>
+            </a:r>
+            <a:r>
+              <a:rPr lang="en-US" dirty="0">
+                <a:solidFill>
+                  <a:srgbClr val="000090"/>
+                </a:solidFill>
+              </a:rPr>
+              <a:t>can find keys and swords in </a:t>
             </a:r>
             <a:r>
               <a:rPr lang="en-US" dirty="0" smtClean="0">
                 <a:solidFill>
-                  <a:srgbClr val="000000"/>
-                </a:solidFill>
-                <a:sym typeface="Wingdings"/>
+                  <a:srgbClr val="000090"/>
+                </a:solidFill>
               </a:rPr>
-              <a:t> </a:t>
-            </a:r>
-            <a:r>
-              <a:rPr lang="en-US" dirty="0" smtClean="0">
-                <a:solidFill>
-                  <a:srgbClr val="000000"/>
-                </a:solidFill>
-              </a:rPr>
-              <a:t>ended gracefully</a:t>
-            </a:r>
+              <a:t>there.</a:t>
+            </a:r>
+          </a:p>
+          <a:p>
+            <a:pPr>
+              <a:buFontTx/>
+              <a:buChar char="-"/>
+            </a:pPr>
             <a:endParaRPr lang="en-US" dirty="0">
               <a:solidFill>
                 <a:srgbClr val="000000"/>
@@ -8454,6 +9829,65 @@
             </a:endParaRPr>
           </a:p>
           <a:p>
+            <a:r>
+              <a:rPr lang="en-US" dirty="0">
+                <a:solidFill>
+                  <a:srgbClr val="000000"/>
+                </a:solidFill>
+              </a:rPr>
+              <a:t>Secrets:</a:t>
+            </a:r>
+          </a:p>
+          <a:p>
+            <a:pPr marL="114300" indent="0">
+              <a:buNone/>
+            </a:pPr>
+            <a:r>
+              <a:rPr lang="en-US" dirty="0">
+                <a:solidFill>
+                  <a:srgbClr val="000000"/>
+                </a:solidFill>
+              </a:rPr>
+              <a:t>-</a:t>
+            </a:r>
+            <a:r>
+              <a:rPr lang="en-US" dirty="0">
+                <a:solidFill>
+                  <a:srgbClr val="000090"/>
+                </a:solidFill>
+              </a:rPr>
+              <a:t>Secret room in the </a:t>
+            </a:r>
+            <a:r>
+              <a:rPr lang="en-US" dirty="0" smtClean="0">
+                <a:solidFill>
+                  <a:srgbClr val="000090"/>
+                </a:solidFill>
+              </a:rPr>
+              <a:t>basement.</a:t>
+            </a:r>
+          </a:p>
+          <a:p>
+            <a:pPr marL="114300" indent="0">
+              <a:buNone/>
+            </a:pPr>
+            <a:endParaRPr lang="en-US" dirty="0">
+              <a:solidFill>
+                <a:srgbClr val="000000"/>
+              </a:solidFill>
+            </a:endParaRPr>
+          </a:p>
+          <a:p>
+            <a:r>
+              <a:rPr lang="en-US" dirty="0" smtClean="0">
+                <a:solidFill>
+                  <a:srgbClr val="000000"/>
+                </a:solidFill>
+              </a:rPr>
+              <a:t>Status Window:</a:t>
+            </a:r>
+          </a:p>
+          <a:p>
             <a:pPr>
               <a:buFontTx/>
               <a:buChar char="-"/>
@@ -8461,10 +9895,46 @@
             <a:r>
               <a:rPr lang="en-US" dirty="0" smtClean="0">
                 <a:solidFill>
-                  <a:srgbClr val="000000"/>
+                  <a:srgbClr val="000090"/>
                 </a:solidFill>
               </a:rPr>
-              <a:t>shows player health, stats and inventory</a:t>
+              <a:t>Allows curses </a:t>
+            </a:r>
+            <a:r>
+              <a:rPr lang="en-US" dirty="0" smtClean="0">
+                <a:solidFill>
+                  <a:srgbClr val="000090"/>
+                </a:solidFill>
+                <a:sym typeface="Wingdings"/>
+              </a:rPr>
+              <a:t> </a:t>
+            </a:r>
+            <a:r>
+              <a:rPr lang="en-US" dirty="0" smtClean="0">
+                <a:solidFill>
+                  <a:srgbClr val="000090"/>
+                </a:solidFill>
+              </a:rPr>
+              <a:t>ended gracefully.</a:t>
+            </a:r>
+            <a:endParaRPr lang="en-US" dirty="0">
+              <a:solidFill>
+                <a:srgbClr val="000090"/>
+              </a:solidFill>
+            </a:endParaRPr>
+          </a:p>
+          <a:p>
+            <a:pPr>
+              <a:buFontTx/>
+              <a:buChar char="-"/>
+            </a:pPr>
+            <a:r>
+              <a:rPr lang="en-US" dirty="0" smtClean="0">
+                <a:solidFill>
+                  <a:srgbClr val="000090"/>
+                </a:solidFill>
+              </a:rPr>
+              <a:t>Shows player health, stats and inventory.</a:t>
             </a:r>
           </a:p>
         </p:txBody>
@@ -8503,7 +9973,7 @@
               <a:t>Features</a:t>
             </a:r>
             <a:r>
-              <a:rPr lang="ar-SA" sz="4000" dirty="0" smtClean="0">
+              <a:rPr lang="x-none" sz="4000" dirty="0" smtClean="0">
                 <a:solidFill>
                   <a:srgbClr val="000000"/>
                 </a:solidFill>
@@ -8522,7 +9992,7 @@
               </a:rPr>
               <a:t>of  the Haunted House</a:t>
             </a:r>
-            <a:endParaRPr lang="ar-SA" sz="4000" dirty="0" smtClean="0">
+            <a:endParaRPr lang="x-none" sz="4000" dirty="0" smtClean="0">
               <a:solidFill>
                 <a:srgbClr val="000000"/>
               </a:solidFill>
@@ -8545,7 +10015,404 @@
   <p:timing>
     <p:tnLst>
       <p:par>
-        <p:cTn id="1" dur="indefinite" restart="never" nodeType="tmRoot"/>
+        <p:cTn id="1" dur="indefinite" restart="never" nodeType="tmRoot">
+          <p:childTnLst>
+            <p:seq concurrent="1" nextAc="seek">
+              <p:cTn id="2" dur="indefinite" nodeType="mainSeq">
+                <p:childTnLst>
+                  <p:par>
+                    <p:cTn id="3" fill="hold">
+                      <p:stCondLst>
+                        <p:cond delay="indefinite"/>
+                      </p:stCondLst>
+                      <p:childTnLst>
+                        <p:par>
+                          <p:cTn id="4" fill="hold">
+                            <p:stCondLst>
+                              <p:cond delay="0"/>
+                            </p:stCondLst>
+                            <p:childTnLst>
+                              <p:par>
+                                <p:cTn id="5" presetID="1" presetClass="entr" presetSubtype="0" fill="hold" nodeType="clickEffect">
+                                  <p:stCondLst>
+                                    <p:cond delay="0"/>
+                                  </p:stCondLst>
+                                  <p:childTnLst>
+                                    <p:set>
+                                      <p:cBhvr>
+                                        <p:cTn id="6" dur="1" fill="hold">
+                                          <p:stCondLst>
+                                            <p:cond delay="0"/>
+                                          </p:stCondLst>
+                                        </p:cTn>
+                                        <p:tgtEl>
+                                          <p:spTgt spid="3">
+                                            <p:txEl>
+                                              <p:pRg st="0" end="0"/>
+                                            </p:txEl>
+                                          </p:spTgt>
+                                        </p:tgtEl>
+                                        <p:attrNameLst>
+                                          <p:attrName>style.visibility</p:attrName>
+                                        </p:attrNameLst>
+                                      </p:cBhvr>
+                                      <p:to>
+                                        <p:strVal val="visible"/>
+                                      </p:to>
+                                    </p:set>
+                                  </p:childTnLst>
+                                </p:cTn>
+                              </p:par>
+                            </p:childTnLst>
+                          </p:cTn>
+                        </p:par>
+                      </p:childTnLst>
+                    </p:cTn>
+                  </p:par>
+                  <p:par>
+                    <p:cTn id="7" fill="hold">
+                      <p:stCondLst>
+                        <p:cond delay="indefinite"/>
+                      </p:stCondLst>
+                      <p:childTnLst>
+                        <p:par>
+                          <p:cTn id="8" fill="hold">
+                            <p:stCondLst>
+                              <p:cond delay="0"/>
+                            </p:stCondLst>
+                            <p:childTnLst>
+                              <p:par>
+                                <p:cTn id="9" presetID="1" presetClass="entr" presetSubtype="0" fill="hold" nodeType="clickEffect">
+                                  <p:stCondLst>
+                                    <p:cond delay="0"/>
+                                  </p:stCondLst>
+                                  <p:childTnLst>
+                                    <p:set>
+                                      <p:cBhvr>
+                                        <p:cTn id="10" dur="1" fill="hold">
+                                          <p:stCondLst>
+                                            <p:cond delay="0"/>
+                                          </p:stCondLst>
+                                        </p:cTn>
+                                        <p:tgtEl>
+                                          <p:spTgt spid="3">
+                                            <p:txEl>
+                                              <p:pRg st="1" end="1"/>
+                                            </p:txEl>
+                                          </p:spTgt>
+                                        </p:tgtEl>
+                                        <p:attrNameLst>
+                                          <p:attrName>style.visibility</p:attrName>
+                                        </p:attrNameLst>
+                                      </p:cBhvr>
+                                      <p:to>
+                                        <p:strVal val="visible"/>
+                                      </p:to>
+                                    </p:set>
+                                  </p:childTnLst>
+                                </p:cTn>
+                              </p:par>
+                            </p:childTnLst>
+                          </p:cTn>
+                        </p:par>
+                      </p:childTnLst>
+                    </p:cTn>
+                  </p:par>
+                  <p:par>
+                    <p:cTn id="11" fill="hold">
+                      <p:stCondLst>
+                        <p:cond delay="indefinite"/>
+                      </p:stCondLst>
+                      <p:childTnLst>
+                        <p:par>
+                          <p:cTn id="12" fill="hold">
+                            <p:stCondLst>
+                              <p:cond delay="0"/>
+                            </p:stCondLst>
+                            <p:childTnLst>
+                              <p:par>
+                                <p:cTn id="13" presetID="1" presetClass="entr" presetSubtype="0" fill="hold" nodeType="clickEffect">
+                                  <p:stCondLst>
+                                    <p:cond delay="0"/>
+                                  </p:stCondLst>
+                                  <p:childTnLst>
+                                    <p:set>
+                                      <p:cBhvr>
+                                        <p:cTn id="14" dur="1" fill="hold">
+                                          <p:stCondLst>
+                                            <p:cond delay="0"/>
+                                          </p:stCondLst>
+                                        </p:cTn>
+                                        <p:tgtEl>
+                                          <p:spTgt spid="3">
+                                            <p:txEl>
+                                              <p:pRg st="2" end="2"/>
+                                            </p:txEl>
+                                          </p:spTgt>
+                                        </p:tgtEl>
+                                        <p:attrNameLst>
+                                          <p:attrName>style.visibility</p:attrName>
+                                        </p:attrNameLst>
+                                      </p:cBhvr>
+                                      <p:to>
+                                        <p:strVal val="visible"/>
+                                      </p:to>
+                                    </p:set>
+                                  </p:childTnLst>
+                                </p:cTn>
+                              </p:par>
+                            </p:childTnLst>
+                          </p:cTn>
+                        </p:par>
+                      </p:childTnLst>
+                    </p:cTn>
+                  </p:par>
+                  <p:par>
+                    <p:cTn id="15" fill="hold">
+                      <p:stCondLst>
+                        <p:cond delay="indefinite"/>
+                      </p:stCondLst>
+                      <p:childTnLst>
+                        <p:par>
+                          <p:cTn id="16" fill="hold">
+                            <p:stCondLst>
+                              <p:cond delay="0"/>
+                            </p:stCondLst>
+                            <p:childTnLst>
+                              <p:par>
+                                <p:cTn id="17" presetID="1" presetClass="entr" presetSubtype="0" fill="hold" nodeType="clickEffect">
+                                  <p:stCondLst>
+                                    <p:cond delay="0"/>
+                                  </p:stCondLst>
+                                  <p:childTnLst>
+                                    <p:set>
+                                      <p:cBhvr>
+                                        <p:cTn id="18" dur="1" fill="hold">
+                                          <p:stCondLst>
+                                            <p:cond delay="0"/>
+                                          </p:stCondLst>
+                                        </p:cTn>
+                                        <p:tgtEl>
+                                          <p:spTgt spid="3">
+                                            <p:txEl>
+                                              <p:pRg st="4" end="4"/>
+                                            </p:txEl>
+                                          </p:spTgt>
+                                        </p:tgtEl>
+                                        <p:attrNameLst>
+                                          <p:attrName>style.visibility</p:attrName>
+                                        </p:attrNameLst>
+                                      </p:cBhvr>
+                                      <p:to>
+                                        <p:strVal val="visible"/>
+                                      </p:to>
+                                    </p:set>
+                                  </p:childTnLst>
+                                </p:cTn>
+                              </p:par>
+                            </p:childTnLst>
+                          </p:cTn>
+                        </p:par>
+                      </p:childTnLst>
+                    </p:cTn>
+                  </p:par>
+                  <p:par>
+                    <p:cTn id="19" fill="hold">
+                      <p:stCondLst>
+                        <p:cond delay="indefinite"/>
+                      </p:stCondLst>
+                      <p:childTnLst>
+                        <p:par>
+                          <p:cTn id="20" fill="hold">
+                            <p:stCondLst>
+                              <p:cond delay="0"/>
+                            </p:stCondLst>
+                            <p:childTnLst>
+                              <p:par>
+                                <p:cTn id="21" presetID="1" presetClass="entr" presetSubtype="0" fill="hold" nodeType="clickEffect">
+                                  <p:stCondLst>
+                                    <p:cond delay="0"/>
+                                  </p:stCondLst>
+                                  <p:childTnLst>
+                                    <p:set>
+                                      <p:cBhvr>
+                                        <p:cTn id="22" dur="1" fill="hold">
+                                          <p:stCondLst>
+                                            <p:cond delay="0"/>
+                                          </p:stCondLst>
+                                        </p:cTn>
+                                        <p:tgtEl>
+                                          <p:spTgt spid="3">
+                                            <p:txEl>
+                                              <p:pRg st="5" end="5"/>
+                                            </p:txEl>
+                                          </p:spTgt>
+                                        </p:tgtEl>
+                                        <p:attrNameLst>
+                                          <p:attrName>style.visibility</p:attrName>
+                                        </p:attrNameLst>
+                                      </p:cBhvr>
+                                      <p:to>
+                                        <p:strVal val="visible"/>
+                                      </p:to>
+                                    </p:set>
+                                  </p:childTnLst>
+                                </p:cTn>
+                              </p:par>
+                            </p:childTnLst>
+                          </p:cTn>
+                        </p:par>
+                      </p:childTnLst>
+                    </p:cTn>
+                  </p:par>
+                  <p:par>
+                    <p:cTn id="23" fill="hold">
+                      <p:stCondLst>
+                        <p:cond delay="indefinite"/>
+                      </p:stCondLst>
+                      <p:childTnLst>
+                        <p:par>
+                          <p:cTn id="24" fill="hold">
+                            <p:stCondLst>
+                              <p:cond delay="0"/>
+                            </p:stCondLst>
+                            <p:childTnLst>
+                              <p:par>
+                                <p:cTn id="25" presetID="1" presetClass="entr" presetSubtype="0" fill="hold" nodeType="clickEffect">
+                                  <p:stCondLst>
+                                    <p:cond delay="0"/>
+                                  </p:stCondLst>
+                                  <p:childTnLst>
+                                    <p:set>
+                                      <p:cBhvr>
+                                        <p:cTn id="26" dur="1" fill="hold">
+                                          <p:stCondLst>
+                                            <p:cond delay="0"/>
+                                          </p:stCondLst>
+                                        </p:cTn>
+                                        <p:tgtEl>
+                                          <p:spTgt spid="3">
+                                            <p:txEl>
+                                              <p:pRg st="7" end="7"/>
+                                            </p:txEl>
+                                          </p:spTgt>
+                                        </p:tgtEl>
+                                        <p:attrNameLst>
+                                          <p:attrName>style.visibility</p:attrName>
+                                        </p:attrNameLst>
+                                      </p:cBhvr>
+                                      <p:to>
+                                        <p:strVal val="visible"/>
+                                      </p:to>
+                                    </p:set>
+                                  </p:childTnLst>
+                                </p:cTn>
+                              </p:par>
+                            </p:childTnLst>
+                          </p:cTn>
+                        </p:par>
+                      </p:childTnLst>
+                    </p:cTn>
+                  </p:par>
+                  <p:par>
+                    <p:cTn id="27" fill="hold">
+                      <p:stCondLst>
+                        <p:cond delay="indefinite"/>
+                      </p:stCondLst>
+                      <p:childTnLst>
+                        <p:par>
+                          <p:cTn id="28" fill="hold">
+                            <p:stCondLst>
+                              <p:cond delay="0"/>
+                            </p:stCondLst>
+                            <p:childTnLst>
+                              <p:par>
+                                <p:cTn id="29" presetID="1" presetClass="entr" presetSubtype="0" fill="hold" nodeType="clickEffect">
+                                  <p:stCondLst>
+                                    <p:cond delay="0"/>
+                                  </p:stCondLst>
+                                  <p:childTnLst>
+                                    <p:set>
+                                      <p:cBhvr>
+                                        <p:cTn id="30" dur="1" fill="hold">
+                                          <p:stCondLst>
+                                            <p:cond delay="0"/>
+                                          </p:stCondLst>
+                                        </p:cTn>
+                                        <p:tgtEl>
+                                          <p:spTgt spid="3">
+                                            <p:txEl>
+                                              <p:pRg st="8" end="8"/>
+                                            </p:txEl>
+                                          </p:spTgt>
+                                        </p:tgtEl>
+                                        <p:attrNameLst>
+                                          <p:attrName>style.visibility</p:attrName>
+                                        </p:attrNameLst>
+                                      </p:cBhvr>
+                                      <p:to>
+                                        <p:strVal val="visible"/>
+                                      </p:to>
+                                    </p:set>
+                                  </p:childTnLst>
+                                </p:cTn>
+                              </p:par>
+                              <p:par>
+                                <p:cTn id="31" presetID="1" presetClass="entr" presetSubtype="0" fill="hold" nodeType="withEffect">
+                                  <p:stCondLst>
+                                    <p:cond delay="0"/>
+                                  </p:stCondLst>
+                                  <p:childTnLst>
+                                    <p:set>
+                                      <p:cBhvr>
+                                        <p:cTn id="32" dur="1" fill="hold">
+                                          <p:stCondLst>
+                                            <p:cond delay="0"/>
+                                          </p:stCondLst>
+                                        </p:cTn>
+                                        <p:tgtEl>
+                                          <p:spTgt spid="3">
+                                            <p:txEl>
+                                              <p:pRg st="9" end="9"/>
+                                            </p:txEl>
+                                          </p:spTgt>
+                                        </p:tgtEl>
+                                        <p:attrNameLst>
+                                          <p:attrName>style.visibility</p:attrName>
+                                        </p:attrNameLst>
+                                      </p:cBhvr>
+                                      <p:to>
+                                        <p:strVal val="visible"/>
+                                      </p:to>
+                                    </p:set>
+                                  </p:childTnLst>
+                                </p:cTn>
+                              </p:par>
+                            </p:childTnLst>
+                          </p:cTn>
+                        </p:par>
+                      </p:childTnLst>
+                    </p:cTn>
+                  </p:par>
+                </p:childTnLst>
+              </p:cTn>
+              <p:prevCondLst>
+                <p:cond evt="onPrev" delay="0">
+                  <p:tgtEl>
+                    <p:sldTgt/>
+                  </p:tgtEl>
+                </p:cond>
+              </p:prevCondLst>
+              <p:nextCondLst>
+                <p:cond evt="onNext" delay="0">
+                  <p:tgtEl>
+                    <p:sldTgt/>
+                  </p:tgtEl>
+                </p:cond>
+              </p:nextCondLst>
+            </p:seq>
+          </p:childTnLst>
+        </p:cTn>
       </p:par>
     </p:tnLst>
   </p:timing>
@@ -8602,7 +10469,7 @@
               </a:rPr>
               <a:t>Live Show </a:t>
             </a:r>
-            <a:endParaRPr lang="ar-SA" sz="4000" dirty="0" smtClean="0">
+            <a:endParaRPr lang="x-none" sz="4000" dirty="0" smtClean="0">
               <a:solidFill>
                 <a:srgbClr val="000000"/>
               </a:solidFill>
@@ -8745,153 +10612,188 @@
           </a:xfrm>
         </p:spPr>
         <p:txBody>
-          <a:bodyPr>
-            <a:normAutofit lnSpcReduction="10000"/>
-          </a:bodyPr>
+          <a:bodyPr/>
           <a:lstStyle/>
           <a:p>
             <a:pPr>
-              <a:buFont typeface="Wingdings" panose="05000000000000000000" pitchFamily="2" charset="2"/>
-              <a:buChar char="Ø"/>
+              <a:buFont typeface="Arial"/>
+              <a:buChar char="•"/>
             </a:pPr>
             <a:r>
-              <a:rPr lang="en-US" dirty="0" smtClean="0"/>
+              <a:rPr lang="en-US" dirty="0" smtClean="0">
+                <a:solidFill>
+                  <a:srgbClr val="000090"/>
+                </a:solidFill>
+              </a:rPr>
               <a:t>More enemies, players and a better combat system.</a:t>
             </a:r>
-            <a:endParaRPr lang="en-US" dirty="0"/>
+            <a:endParaRPr lang="en-US" dirty="0">
+              <a:solidFill>
+                <a:srgbClr val="000090"/>
+              </a:solidFill>
+            </a:endParaRPr>
           </a:p>
           <a:p>
             <a:pPr>
-              <a:buFont typeface="Wingdings" panose="05000000000000000000" pitchFamily="2" charset="2"/>
-              <a:buChar char="Ø"/>
+              <a:buFont typeface="Arial"/>
+              <a:buChar char="•"/>
             </a:pPr>
             <a:r>
-              <a:rPr lang="en-GB" dirty="0" smtClean="0"/>
-              <a:t>More potions with different effects</a:t>
-            </a:r>
-            <a:r>
-              <a:rPr lang="en-GB" dirty="0" smtClean="0"/>
-              <a:t>.</a:t>
+              <a:rPr lang="en-GB" dirty="0" smtClean="0">
+                <a:solidFill>
+                  <a:srgbClr val="000090"/>
+                </a:solidFill>
+              </a:rPr>
+              <a:t>More potions with different effects.</a:t>
             </a:r>
           </a:p>
           <a:p>
             <a:pPr>
-              <a:buFont typeface="Wingdings" panose="05000000000000000000" pitchFamily="2" charset="2"/>
-              <a:buChar char="Ø"/>
+              <a:buFont typeface="Arial"/>
+              <a:buChar char="•"/>
             </a:pPr>
             <a:r>
-              <a:rPr lang="en-GB" dirty="0" smtClean="0"/>
-              <a:t>More floors to increase the map size</a:t>
-            </a:r>
-            <a:endParaRPr lang="en-GB" dirty="0" smtClean="0"/>
+              <a:rPr lang="en-GB" dirty="0" smtClean="0">
+                <a:solidFill>
+                  <a:srgbClr val="000090"/>
+                </a:solidFill>
+              </a:rPr>
+              <a:t>Save/Load function.</a:t>
+            </a:r>
           </a:p>
           <a:p>
             <a:pPr>
-              <a:buFont typeface="Wingdings" panose="05000000000000000000" pitchFamily="2" charset="2"/>
-              <a:buChar char="Ø"/>
+              <a:buFont typeface="Arial"/>
+              <a:buChar char="•"/>
             </a:pPr>
             <a:r>
-              <a:rPr lang="en-GB" dirty="0" smtClean="0"/>
-              <a:t>Save/Load function.</a:t>
+              <a:rPr lang="en-GB" dirty="0" smtClean="0">
+                <a:solidFill>
+                  <a:srgbClr val="000090"/>
+                </a:solidFill>
+              </a:rPr>
+              <a:t>Slots for gear on the player and items for the gear slots.</a:t>
             </a:r>
           </a:p>
           <a:p>
             <a:pPr>
-              <a:buFont typeface="Wingdings" panose="05000000000000000000" pitchFamily="2" charset="2"/>
-              <a:buChar char="Ø"/>
+              <a:buFont typeface="Arial"/>
+              <a:buChar char="•"/>
             </a:pPr>
             <a:r>
-              <a:rPr lang="en-GB" dirty="0" smtClean="0"/>
-              <a:t>Slots for gear on the player and items for the gear slots.</a:t>
+              <a:rPr lang="en-GB" dirty="0" smtClean="0">
+                <a:solidFill>
+                  <a:srgbClr val="000090"/>
+                </a:solidFill>
+              </a:rPr>
+              <a:t>Adding spells and better mana usage. Quests.</a:t>
             </a:r>
           </a:p>
           <a:p>
             <a:pPr>
-              <a:buFont typeface="Wingdings" panose="05000000000000000000" pitchFamily="2" charset="2"/>
-              <a:buChar char="Ø"/>
+              <a:buFont typeface="Arial"/>
+              <a:buChar char="•"/>
             </a:pPr>
             <a:r>
-              <a:rPr lang="en-GB" dirty="0" smtClean="0"/>
-              <a:t>Adding spells and better mana usage. Quests.</a:t>
+              <a:rPr lang="en-GB" dirty="0" smtClean="0">
+                <a:solidFill>
+                  <a:srgbClr val="000090"/>
+                </a:solidFill>
+              </a:rPr>
+              <a:t>More rooms with more interactions.</a:t>
             </a:r>
           </a:p>
           <a:p>
             <a:pPr>
-              <a:buFont typeface="Wingdings" panose="05000000000000000000" pitchFamily="2" charset="2"/>
-              <a:buChar char="Ø"/>
+              <a:buFont typeface="Arial"/>
+              <a:buChar char="•"/>
             </a:pPr>
             <a:r>
-              <a:rPr lang="en-GB" dirty="0" smtClean="0"/>
-              <a:t>More rooms with more interactions.</a:t>
+              <a:rPr lang="en-GB" dirty="0" smtClean="0">
+                <a:solidFill>
+                  <a:srgbClr val="000090"/>
+                </a:solidFill>
+              </a:rPr>
+              <a:t>Keys to lock doors(enemies chasing the player).</a:t>
             </a:r>
           </a:p>
           <a:p>
             <a:pPr>
-              <a:buFont typeface="Wingdings" panose="05000000000000000000" pitchFamily="2" charset="2"/>
-              <a:buChar char="Ø"/>
+              <a:buFont typeface="Arial"/>
+              <a:buChar char="•"/>
             </a:pPr>
             <a:r>
-              <a:rPr lang="en-GB" dirty="0" smtClean="0"/>
-              <a:t>Locking </a:t>
-            </a:r>
-            <a:r>
-              <a:rPr lang="en-GB" dirty="0" smtClean="0"/>
-              <a:t>doors(enemies chasing the player).</a:t>
+              <a:rPr lang="en-GB" dirty="0" smtClean="0">
+                <a:solidFill>
+                  <a:srgbClr val="000090"/>
+                </a:solidFill>
+              </a:rPr>
+              <a:t>Longer game and choices that impact the game.</a:t>
             </a:r>
           </a:p>
           <a:p>
             <a:pPr>
-              <a:buFont typeface="Wingdings" panose="05000000000000000000" pitchFamily="2" charset="2"/>
-              <a:buChar char="Ø"/>
+              <a:buFont typeface="Arial"/>
+              <a:buChar char="•"/>
             </a:pPr>
             <a:r>
-              <a:rPr lang="en-GB" dirty="0" smtClean="0"/>
-              <a:t>Longer game and choices that impact the game.</a:t>
+              <a:rPr lang="en-GB" dirty="0" smtClean="0">
+                <a:solidFill>
+                  <a:srgbClr val="000090"/>
+                </a:solidFill>
+              </a:rPr>
+              <a:t>Different endings of the game.</a:t>
             </a:r>
           </a:p>
           <a:p>
             <a:pPr>
-              <a:buFont typeface="Wingdings" panose="05000000000000000000" pitchFamily="2" charset="2"/>
-              <a:buChar char="Ø"/>
+              <a:buFont typeface="Arial"/>
+              <a:buChar char="•"/>
             </a:pPr>
             <a:r>
-              <a:rPr lang="en-GB" dirty="0" smtClean="0"/>
-              <a:t>Different endings of the game.</a:t>
+              <a:rPr lang="en-GB" dirty="0" smtClean="0">
+                <a:solidFill>
+                  <a:srgbClr val="000090"/>
+                </a:solidFill>
+              </a:rPr>
+              <a:t>Adding NPCs and more secrets.</a:t>
             </a:r>
           </a:p>
           <a:p>
             <a:pPr>
-              <a:buFont typeface="Wingdings" panose="05000000000000000000" pitchFamily="2" charset="2"/>
-              <a:buChar char="Ø"/>
+              <a:buFont typeface="Arial"/>
+              <a:buChar char="•"/>
             </a:pPr>
             <a:r>
-              <a:rPr lang="en-GB" dirty="0" smtClean="0"/>
-              <a:t>Adding NPCs and more secrets.</a:t>
+              <a:rPr lang="en-GB" dirty="0" smtClean="0">
+                <a:solidFill>
+                  <a:srgbClr val="000090"/>
+                </a:solidFill>
+              </a:rPr>
+              <a:t>Status window to show enemy health and stats.</a:t>
             </a:r>
           </a:p>
           <a:p>
             <a:pPr>
-              <a:buFont typeface="Wingdings" panose="05000000000000000000" pitchFamily="2" charset="2"/>
-              <a:buChar char="Ø"/>
+              <a:buFont typeface="Arial"/>
+              <a:buChar char="•"/>
             </a:pPr>
-            <a:r>
-              <a:rPr lang="en-GB" dirty="0" smtClean="0"/>
-              <a:t>Status window to show enemy health and stats.</a:t>
-            </a:r>
+            <a:endParaRPr lang="en-GB" dirty="0" smtClean="0">
+              <a:solidFill>
+                <a:srgbClr val="000090"/>
+              </a:solidFill>
+            </a:endParaRPr>
           </a:p>
           <a:p>
             <a:pPr>
-              <a:buFont typeface="Wingdings" panose="05000000000000000000" pitchFamily="2" charset="2"/>
-              <a:buChar char="Ø"/>
+              <a:buFont typeface="Arial"/>
+              <a:buChar char="•"/>
             </a:pPr>
-            <a:endParaRPr lang="en-GB" dirty="0" smtClean="0"/>
-          </a:p>
-          <a:p>
-            <a:pPr>
-              <a:buFont typeface="Wingdings" panose="05000000000000000000" pitchFamily="2" charset="2"/>
-              <a:buChar char="Ø"/>
-            </a:pPr>
-            <a:endParaRPr lang="en-US" dirty="0" smtClean="0"/>
+            <a:endParaRPr lang="en-US" dirty="0" smtClean="0">
+              <a:solidFill>
+                <a:srgbClr val="000090"/>
+              </a:solidFill>
+            </a:endParaRPr>
           </a:p>
         </p:txBody>
       </p:sp>
@@ -8928,7 +10830,7 @@
               </a:rPr>
               <a:t>Future Developments</a:t>
             </a:r>
-            <a:endParaRPr lang="ar-SA" sz="4000" dirty="0" smtClean="0">
+            <a:endParaRPr lang="x-none" sz="4000" dirty="0" smtClean="0">
               <a:solidFill>
                 <a:srgbClr val="000000"/>
               </a:solidFill>
@@ -8951,7 +10853,569 @@
   <p:timing>
     <p:tnLst>
       <p:par>
-        <p:cTn id="1" dur="indefinite" restart="never" nodeType="tmRoot"/>
+        <p:cTn id="1" dur="indefinite" restart="never" nodeType="tmRoot">
+          <p:childTnLst>
+            <p:seq concurrent="1" nextAc="seek">
+              <p:cTn id="2" dur="indefinite" nodeType="mainSeq">
+                <p:childTnLst>
+                  <p:par>
+                    <p:cTn id="3" fill="hold">
+                      <p:stCondLst>
+                        <p:cond delay="indefinite"/>
+                      </p:stCondLst>
+                      <p:childTnLst>
+                        <p:par>
+                          <p:cTn id="4" fill="hold">
+                            <p:stCondLst>
+                              <p:cond delay="0"/>
+                            </p:stCondLst>
+                            <p:childTnLst>
+                              <p:par>
+                                <p:cTn id="5" presetID="1" presetClass="entr" presetSubtype="0" fill="hold" nodeType="clickEffect">
+                                  <p:stCondLst>
+                                    <p:cond delay="0"/>
+                                  </p:stCondLst>
+                                  <p:childTnLst>
+                                    <p:set>
+                                      <p:cBhvr>
+                                        <p:cTn id="6" dur="1" fill="hold">
+                                          <p:stCondLst>
+                                            <p:cond delay="0"/>
+                                          </p:stCondLst>
+                                        </p:cTn>
+                                        <p:tgtEl>
+                                          <p:spTgt spid="3">
+                                            <p:txEl>
+                                              <p:pRg st="0" end="0"/>
+                                            </p:txEl>
+                                          </p:spTgt>
+                                        </p:tgtEl>
+                                        <p:attrNameLst>
+                                          <p:attrName>style.visibility</p:attrName>
+                                        </p:attrNameLst>
+                                      </p:cBhvr>
+                                      <p:to>
+                                        <p:strVal val="visible"/>
+                                      </p:to>
+                                    </p:set>
+                                  </p:childTnLst>
+                                </p:cTn>
+                              </p:par>
+                            </p:childTnLst>
+                          </p:cTn>
+                        </p:par>
+                      </p:childTnLst>
+                    </p:cTn>
+                  </p:par>
+                  <p:par>
+                    <p:cTn id="7" fill="hold">
+                      <p:stCondLst>
+                        <p:cond delay="indefinite"/>
+                      </p:stCondLst>
+                      <p:childTnLst>
+                        <p:par>
+                          <p:cTn id="8" fill="hold">
+                            <p:stCondLst>
+                              <p:cond delay="0"/>
+                            </p:stCondLst>
+                            <p:childTnLst>
+                              <p:par>
+                                <p:cTn id="9" presetID="1" presetClass="entr" presetSubtype="0" fill="hold" nodeType="clickEffect">
+                                  <p:stCondLst>
+                                    <p:cond delay="0"/>
+                                  </p:stCondLst>
+                                  <p:childTnLst>
+                                    <p:set>
+                                      <p:cBhvr>
+                                        <p:cTn id="10" dur="1" fill="hold">
+                                          <p:stCondLst>
+                                            <p:cond delay="0"/>
+                                          </p:stCondLst>
+                                        </p:cTn>
+                                        <p:tgtEl>
+                                          <p:spTgt spid="3">
+                                            <p:txEl>
+                                              <p:pRg st="1" end="1"/>
+                                            </p:txEl>
+                                          </p:spTgt>
+                                        </p:tgtEl>
+                                        <p:attrNameLst>
+                                          <p:attrName>style.visibility</p:attrName>
+                                        </p:attrNameLst>
+                                      </p:cBhvr>
+                                      <p:to>
+                                        <p:strVal val="visible"/>
+                                      </p:to>
+                                    </p:set>
+                                  </p:childTnLst>
+                                </p:cTn>
+                              </p:par>
+                            </p:childTnLst>
+                          </p:cTn>
+                        </p:par>
+                      </p:childTnLst>
+                    </p:cTn>
+                  </p:par>
+                  <p:par>
+                    <p:cTn id="11" fill="hold">
+                      <p:stCondLst>
+                        <p:cond delay="indefinite"/>
+                      </p:stCondLst>
+                      <p:childTnLst>
+                        <p:par>
+                          <p:cTn id="12" fill="hold">
+                            <p:stCondLst>
+                              <p:cond delay="0"/>
+                            </p:stCondLst>
+                            <p:childTnLst>
+                              <p:par>
+                                <p:cTn id="13" presetID="1" presetClass="entr" presetSubtype="0" fill="hold" nodeType="clickEffect">
+                                  <p:stCondLst>
+                                    <p:cond delay="0"/>
+                                  </p:stCondLst>
+                                  <p:childTnLst>
+                                    <p:set>
+                                      <p:cBhvr>
+                                        <p:cTn id="14" dur="1" fill="hold">
+                                          <p:stCondLst>
+                                            <p:cond delay="0"/>
+                                          </p:stCondLst>
+                                        </p:cTn>
+                                        <p:tgtEl>
+                                          <p:spTgt spid="3">
+                                            <p:txEl>
+                                              <p:pRg st="2" end="2"/>
+                                            </p:txEl>
+                                          </p:spTgt>
+                                        </p:tgtEl>
+                                        <p:attrNameLst>
+                                          <p:attrName>style.visibility</p:attrName>
+                                        </p:attrNameLst>
+                                      </p:cBhvr>
+                                      <p:to>
+                                        <p:strVal val="visible"/>
+                                      </p:to>
+                                    </p:set>
+                                  </p:childTnLst>
+                                </p:cTn>
+                              </p:par>
+                            </p:childTnLst>
+                          </p:cTn>
+                        </p:par>
+                      </p:childTnLst>
+                    </p:cTn>
+                  </p:par>
+                  <p:par>
+                    <p:cTn id="15" fill="hold">
+                      <p:stCondLst>
+                        <p:cond delay="indefinite"/>
+                      </p:stCondLst>
+                      <p:childTnLst>
+                        <p:par>
+                          <p:cTn id="16" fill="hold">
+                            <p:stCondLst>
+                              <p:cond delay="0"/>
+                            </p:stCondLst>
+                            <p:childTnLst>
+                              <p:par>
+                                <p:cTn id="17" presetID="1" presetClass="entr" presetSubtype="0" fill="hold" nodeType="clickEffect">
+                                  <p:stCondLst>
+                                    <p:cond delay="0"/>
+                                  </p:stCondLst>
+                                  <p:childTnLst>
+                                    <p:set>
+                                      <p:cBhvr>
+                                        <p:cTn id="18" dur="1" fill="hold">
+                                          <p:stCondLst>
+                                            <p:cond delay="0"/>
+                                          </p:stCondLst>
+                                        </p:cTn>
+                                        <p:tgtEl>
+                                          <p:spTgt spid="3">
+                                            <p:txEl>
+                                              <p:pRg st="3" end="3"/>
+                                            </p:txEl>
+                                          </p:spTgt>
+                                        </p:tgtEl>
+                                        <p:attrNameLst>
+                                          <p:attrName>style.visibility</p:attrName>
+                                        </p:attrNameLst>
+                                      </p:cBhvr>
+                                      <p:to>
+                                        <p:strVal val="visible"/>
+                                      </p:to>
+                                    </p:set>
+                                  </p:childTnLst>
+                                </p:cTn>
+                              </p:par>
+                            </p:childTnLst>
+                          </p:cTn>
+                        </p:par>
+                      </p:childTnLst>
+                    </p:cTn>
+                  </p:par>
+                  <p:par>
+                    <p:cTn id="19" fill="hold">
+                      <p:stCondLst>
+                        <p:cond delay="indefinite"/>
+                      </p:stCondLst>
+                      <p:childTnLst>
+                        <p:par>
+                          <p:cTn id="20" fill="hold">
+                            <p:stCondLst>
+                              <p:cond delay="0"/>
+                            </p:stCondLst>
+                            <p:childTnLst>
+                              <p:par>
+                                <p:cTn id="21" presetID="1" presetClass="entr" presetSubtype="0" fill="hold" nodeType="clickEffect">
+                                  <p:stCondLst>
+                                    <p:cond delay="0"/>
+                                  </p:stCondLst>
+                                  <p:childTnLst>
+                                    <p:set>
+                                      <p:cBhvr>
+                                        <p:cTn id="22" dur="1" fill="hold">
+                                          <p:stCondLst>
+                                            <p:cond delay="0"/>
+                                          </p:stCondLst>
+                                        </p:cTn>
+                                        <p:tgtEl>
+                                          <p:spTgt spid="3">
+                                            <p:txEl>
+                                              <p:pRg st="4" end="4"/>
+                                            </p:txEl>
+                                          </p:spTgt>
+                                        </p:tgtEl>
+                                        <p:attrNameLst>
+                                          <p:attrName>style.visibility</p:attrName>
+                                        </p:attrNameLst>
+                                      </p:cBhvr>
+                                      <p:to>
+                                        <p:strVal val="visible"/>
+                                      </p:to>
+                                    </p:set>
+                                  </p:childTnLst>
+                                </p:cTn>
+                              </p:par>
+                            </p:childTnLst>
+                          </p:cTn>
+                        </p:par>
+                      </p:childTnLst>
+                    </p:cTn>
+                  </p:par>
+                  <p:par>
+                    <p:cTn id="23" fill="hold">
+                      <p:stCondLst>
+                        <p:cond delay="indefinite"/>
+                      </p:stCondLst>
+                      <p:childTnLst>
+                        <p:par>
+                          <p:cTn id="24" fill="hold">
+                            <p:stCondLst>
+                              <p:cond delay="0"/>
+                            </p:stCondLst>
+                            <p:childTnLst>
+                              <p:par>
+                                <p:cTn id="25" presetID="1" presetClass="entr" presetSubtype="0" fill="hold" nodeType="clickEffect">
+                                  <p:stCondLst>
+                                    <p:cond delay="0"/>
+                                  </p:stCondLst>
+                                  <p:childTnLst>
+                                    <p:set>
+                                      <p:cBhvr>
+                                        <p:cTn id="26" dur="1" fill="hold">
+                                          <p:stCondLst>
+                                            <p:cond delay="0"/>
+                                          </p:stCondLst>
+                                        </p:cTn>
+                                        <p:tgtEl>
+                                          <p:spTgt spid="3">
+                                            <p:txEl>
+                                              <p:pRg st="5" end="5"/>
+                                            </p:txEl>
+                                          </p:spTgt>
+                                        </p:tgtEl>
+                                        <p:attrNameLst>
+                                          <p:attrName>style.visibility</p:attrName>
+                                        </p:attrNameLst>
+                                      </p:cBhvr>
+                                      <p:to>
+                                        <p:strVal val="visible"/>
+                                      </p:to>
+                                    </p:set>
+                                  </p:childTnLst>
+                                </p:cTn>
+                              </p:par>
+                            </p:childTnLst>
+                          </p:cTn>
+                        </p:par>
+                      </p:childTnLst>
+                    </p:cTn>
+                  </p:par>
+                  <p:par>
+                    <p:cTn id="27" fill="hold">
+                      <p:stCondLst>
+                        <p:cond delay="indefinite"/>
+                      </p:stCondLst>
+                      <p:childTnLst>
+                        <p:par>
+                          <p:cTn id="28" fill="hold">
+                            <p:stCondLst>
+                              <p:cond delay="0"/>
+                            </p:stCondLst>
+                            <p:childTnLst>
+                              <p:par>
+                                <p:cTn id="29" presetID="1" presetClass="entr" presetSubtype="0" fill="hold" nodeType="clickEffect">
+                                  <p:stCondLst>
+                                    <p:cond delay="0"/>
+                                  </p:stCondLst>
+                                  <p:childTnLst>
+                                    <p:set>
+                                      <p:cBhvr>
+                                        <p:cTn id="30" dur="1" fill="hold">
+                                          <p:stCondLst>
+                                            <p:cond delay="0"/>
+                                          </p:stCondLst>
+                                        </p:cTn>
+                                        <p:tgtEl>
+                                          <p:spTgt spid="3">
+                                            <p:txEl>
+                                              <p:pRg st="6" end="6"/>
+                                            </p:txEl>
+                                          </p:spTgt>
+                                        </p:tgtEl>
+                                        <p:attrNameLst>
+                                          <p:attrName>style.visibility</p:attrName>
+                                        </p:attrNameLst>
+                                      </p:cBhvr>
+                                      <p:to>
+                                        <p:strVal val="visible"/>
+                                      </p:to>
+                                    </p:set>
+                                  </p:childTnLst>
+                                </p:cTn>
+                              </p:par>
+                            </p:childTnLst>
+                          </p:cTn>
+                        </p:par>
+                      </p:childTnLst>
+                    </p:cTn>
+                  </p:par>
+                  <p:par>
+                    <p:cTn id="31" fill="hold">
+                      <p:stCondLst>
+                        <p:cond delay="indefinite"/>
+                      </p:stCondLst>
+                      <p:childTnLst>
+                        <p:par>
+                          <p:cTn id="32" fill="hold">
+                            <p:stCondLst>
+                              <p:cond delay="0"/>
+                            </p:stCondLst>
+                            <p:childTnLst>
+                              <p:par>
+                                <p:cTn id="33" presetID="1" presetClass="entr" presetSubtype="0" fill="hold" nodeType="clickEffect">
+                                  <p:stCondLst>
+                                    <p:cond delay="0"/>
+                                  </p:stCondLst>
+                                  <p:childTnLst>
+                                    <p:set>
+                                      <p:cBhvr>
+                                        <p:cTn id="34" dur="1" fill="hold">
+                                          <p:stCondLst>
+                                            <p:cond delay="0"/>
+                                          </p:stCondLst>
+                                        </p:cTn>
+                                        <p:tgtEl>
+                                          <p:spTgt spid="3">
+                                            <p:txEl>
+                                              <p:pRg st="7" end="7"/>
+                                            </p:txEl>
+                                          </p:spTgt>
+                                        </p:tgtEl>
+                                        <p:attrNameLst>
+                                          <p:attrName>style.visibility</p:attrName>
+                                        </p:attrNameLst>
+                                      </p:cBhvr>
+                                      <p:to>
+                                        <p:strVal val="visible"/>
+                                      </p:to>
+                                    </p:set>
+                                  </p:childTnLst>
+                                </p:cTn>
+                              </p:par>
+                            </p:childTnLst>
+                          </p:cTn>
+                        </p:par>
+                      </p:childTnLst>
+                    </p:cTn>
+                  </p:par>
+                  <p:par>
+                    <p:cTn id="35" fill="hold">
+                      <p:stCondLst>
+                        <p:cond delay="indefinite"/>
+                      </p:stCondLst>
+                      <p:childTnLst>
+                        <p:par>
+                          <p:cTn id="36" fill="hold">
+                            <p:stCondLst>
+                              <p:cond delay="0"/>
+                            </p:stCondLst>
+                            <p:childTnLst>
+                              <p:par>
+                                <p:cTn id="37" presetID="1" presetClass="entr" presetSubtype="0" fill="hold" nodeType="clickEffect">
+                                  <p:stCondLst>
+                                    <p:cond delay="0"/>
+                                  </p:stCondLst>
+                                  <p:childTnLst>
+                                    <p:set>
+                                      <p:cBhvr>
+                                        <p:cTn id="38" dur="1" fill="hold">
+                                          <p:stCondLst>
+                                            <p:cond delay="0"/>
+                                          </p:stCondLst>
+                                        </p:cTn>
+                                        <p:tgtEl>
+                                          <p:spTgt spid="3">
+                                            <p:txEl>
+                                              <p:pRg st="8" end="8"/>
+                                            </p:txEl>
+                                          </p:spTgt>
+                                        </p:tgtEl>
+                                        <p:attrNameLst>
+                                          <p:attrName>style.visibility</p:attrName>
+                                        </p:attrNameLst>
+                                      </p:cBhvr>
+                                      <p:to>
+                                        <p:strVal val="visible"/>
+                                      </p:to>
+                                    </p:set>
+                                  </p:childTnLst>
+                                </p:cTn>
+                              </p:par>
+                            </p:childTnLst>
+                          </p:cTn>
+                        </p:par>
+                      </p:childTnLst>
+                    </p:cTn>
+                  </p:par>
+                  <p:par>
+                    <p:cTn id="39" fill="hold">
+                      <p:stCondLst>
+                        <p:cond delay="indefinite"/>
+                      </p:stCondLst>
+                      <p:childTnLst>
+                        <p:par>
+                          <p:cTn id="40" fill="hold">
+                            <p:stCondLst>
+                              <p:cond delay="0"/>
+                            </p:stCondLst>
+                            <p:childTnLst>
+                              <p:par>
+                                <p:cTn id="41" presetID="1" presetClass="entr" presetSubtype="0" fill="hold" nodeType="clickEffect">
+                                  <p:stCondLst>
+                                    <p:cond delay="0"/>
+                                  </p:stCondLst>
+                                  <p:childTnLst>
+                                    <p:set>
+                                      <p:cBhvr>
+                                        <p:cTn id="42" dur="1" fill="hold">
+                                          <p:stCondLst>
+                                            <p:cond delay="0"/>
+                                          </p:stCondLst>
+                                        </p:cTn>
+                                        <p:tgtEl>
+                                          <p:spTgt spid="3">
+                                            <p:txEl>
+                                              <p:pRg st="9" end="9"/>
+                                            </p:txEl>
+                                          </p:spTgt>
+                                        </p:tgtEl>
+                                        <p:attrNameLst>
+                                          <p:attrName>style.visibility</p:attrName>
+                                        </p:attrNameLst>
+                                      </p:cBhvr>
+                                      <p:to>
+                                        <p:strVal val="visible"/>
+                                      </p:to>
+                                    </p:set>
+                                  </p:childTnLst>
+                                </p:cTn>
+                              </p:par>
+                            </p:childTnLst>
+                          </p:cTn>
+                        </p:par>
+                      </p:childTnLst>
+                    </p:cTn>
+                  </p:par>
+                  <p:par>
+                    <p:cTn id="43" fill="hold">
+                      <p:stCondLst>
+                        <p:cond delay="indefinite"/>
+                      </p:stCondLst>
+                      <p:childTnLst>
+                        <p:par>
+                          <p:cTn id="44" fill="hold">
+                            <p:stCondLst>
+                              <p:cond delay="0"/>
+                            </p:stCondLst>
+                            <p:childTnLst>
+                              <p:par>
+                                <p:cTn id="45" presetID="1" presetClass="entr" presetSubtype="0" fill="hold" nodeType="clickEffect">
+                                  <p:stCondLst>
+                                    <p:cond delay="0"/>
+                                  </p:stCondLst>
+                                  <p:childTnLst>
+                                    <p:set>
+                                      <p:cBhvr>
+                                        <p:cTn id="46" dur="1" fill="hold">
+                                          <p:stCondLst>
+                                            <p:cond delay="0"/>
+                                          </p:stCondLst>
+                                        </p:cTn>
+                                        <p:tgtEl>
+                                          <p:spTgt spid="3">
+                                            <p:txEl>
+                                              <p:pRg st="10" end="10"/>
+                                            </p:txEl>
+                                          </p:spTgt>
+                                        </p:tgtEl>
+                                        <p:attrNameLst>
+                                          <p:attrName>style.visibility</p:attrName>
+                                        </p:attrNameLst>
+                                      </p:cBhvr>
+                                      <p:to>
+                                        <p:strVal val="visible"/>
+                                      </p:to>
+                                    </p:set>
+                                  </p:childTnLst>
+                                </p:cTn>
+                              </p:par>
+                            </p:childTnLst>
+                          </p:cTn>
+                        </p:par>
+                      </p:childTnLst>
+                    </p:cTn>
+                  </p:par>
+                </p:childTnLst>
+              </p:cTn>
+              <p:prevCondLst>
+                <p:cond evt="onPrev" delay="0">
+                  <p:tgtEl>
+                    <p:sldTgt/>
+                  </p:tgtEl>
+                </p:cond>
+              </p:prevCondLst>
+              <p:nextCondLst>
+                <p:cond evt="onNext" delay="0">
+                  <p:tgtEl>
+                    <p:sldTgt/>
+                  </p:tgtEl>
+                </p:cond>
+              </p:nextCondLst>
+            </p:seq>
+          </p:childTnLst>
+        </p:cTn>
       </p:par>
     </p:tnLst>
   </p:timing>

</xml_diff>